<commit_message>
Updates to slides for Session 1 (Intro) and Session 4 (Data)
</commit_message>
<xml_diff>
--- a/Slides/1 - Introducing Knockout.pptx
+++ b/Slides/1 - Introducing Knockout.pptx
@@ -16,13 +16,13 @@
     <p:sldId id="457" r:id="rId7"/>
     <p:sldId id="438" r:id="rId8"/>
     <p:sldId id="472" r:id="rId9"/>
-    <p:sldId id="257" r:id="rId10"/>
-    <p:sldId id="444" r:id="rId11"/>
-    <p:sldId id="473" r:id="rId12"/>
-    <p:sldId id="474" r:id="rId13"/>
-    <p:sldId id="475" r:id="rId14"/>
-    <p:sldId id="476" r:id="rId15"/>
-    <p:sldId id="477" r:id="rId16"/>
+    <p:sldId id="444" r:id="rId10"/>
+    <p:sldId id="473" r:id="rId11"/>
+    <p:sldId id="474" r:id="rId12"/>
+    <p:sldId id="475" r:id="rId13"/>
+    <p:sldId id="476" r:id="rId14"/>
+    <p:sldId id="477" r:id="rId15"/>
+    <p:sldId id="479" r:id="rId16"/>
     <p:sldId id="466" r:id="rId17"/>
     <p:sldId id="468" r:id="rId18"/>
     <p:sldId id="469" r:id="rId19"/>
@@ -142,13 +142,13 @@
             <p14:sldId id="457"/>
             <p14:sldId id="438"/>
             <p14:sldId id="472"/>
-            <p14:sldId id="257"/>
             <p14:sldId id="444"/>
             <p14:sldId id="473"/>
             <p14:sldId id="474"/>
             <p14:sldId id="475"/>
             <p14:sldId id="476"/>
             <p14:sldId id="477"/>
+            <p14:sldId id="479"/>
             <p14:sldId id="466"/>
             <p14:sldId id="468"/>
             <p14:sldId id="469"/>
@@ -658,6 +658,24 @@
           <a:bodyPr/>
           <a:lstStyle/>
           <a:p>
+            <a:r>
+              <a:rPr lang="en-US" dirty="0" smtClean="0"/>
+              <a:t>Textbox</a:t>
+            </a:r>
+            <a:r>
+              <a:rPr lang="en-US" baseline="0" dirty="0" smtClean="0"/>
+              <a:t> and heading bound to same observable</a:t>
+            </a:r>
+          </a:p>
+          <a:p>
+            <a:r>
+              <a:rPr lang="en-US" baseline="0" dirty="0" smtClean="0"/>
+              <a:t>Update textbox, see </a:t>
+            </a:r>
+            <a:r>
+              <a:rPr lang="en-US" baseline="0" smtClean="0"/>
+              <a:t>heading update</a:t>
+            </a:r>
             <a:endParaRPr lang="en-US" dirty="0"/>
           </a:p>
         </p:txBody>
@@ -679,7 +697,7 @@
           <a:p>
             <a:fld id="{906AB01E-7BD7-442B-8A6B-D31FAFDAE830}" type="slidenum">
               <a:rPr lang="en-US" smtClean="0"/>
-              <a:t>20</a:t>
+              <a:t>22</a:t>
             </a:fld>
             <a:endParaRPr lang="en-US"/>
           </a:p>
@@ -688,7 +706,7 @@
     </p:spTree>
     <p:extLst>
       <p:ext uri="{BB962C8B-B14F-4D97-AF65-F5344CB8AC3E}">
-        <p14:creationId xmlns:p14="http://schemas.microsoft.com/office/powerpoint/2010/main" val="1149675431"/>
+        <p14:creationId xmlns:p14="http://schemas.microsoft.com/office/powerpoint/2010/main" val="2952098258"/>
       </p:ext>
     </p:extLst>
   </p:cSld>
@@ -1027,14 +1045,14 @@
               <a:rPr lang="en-US" smtClean="0"/>
               <a:t>9</a:t>
             </a:fld>
-            <a:endParaRPr lang="en-US" dirty="0"/>
+            <a:endParaRPr lang="en-US"/>
           </a:p>
         </p:txBody>
       </p:sp>
     </p:spTree>
     <p:extLst>
       <p:ext uri="{BB962C8B-B14F-4D97-AF65-F5344CB8AC3E}">
-        <p14:creationId xmlns:p14="http://schemas.microsoft.com/office/powerpoint/2010/main" val="3461503664"/>
+        <p14:creationId xmlns:p14="http://schemas.microsoft.com/office/powerpoint/2010/main" val="1724137595"/>
       </p:ext>
     </p:extLst>
   </p:cSld>
@@ -1109,7 +1127,7 @@
           <a:p>
             <a:fld id="{906AB01E-7BD7-442B-8A6B-D31FAFDAE830}" type="slidenum">
               <a:rPr lang="en-US" smtClean="0"/>
-              <a:t>10</a:t>
+              <a:t>17</a:t>
             </a:fld>
             <a:endParaRPr lang="en-US"/>
           </a:p>
@@ -1118,7 +1136,7 @@
     </p:spTree>
     <p:extLst>
       <p:ext uri="{BB962C8B-B14F-4D97-AF65-F5344CB8AC3E}">
-        <p14:creationId xmlns:p14="http://schemas.microsoft.com/office/powerpoint/2010/main" val="1724137595"/>
+        <p14:creationId xmlns:p14="http://schemas.microsoft.com/office/powerpoint/2010/main" val="3414845990"/>
       </p:ext>
     </p:extLst>
   </p:cSld>
@@ -1193,7 +1211,7 @@
           <a:p>
             <a:fld id="{906AB01E-7BD7-442B-8A6B-D31FAFDAE830}" type="slidenum">
               <a:rPr lang="en-US" smtClean="0"/>
-              <a:t>17</a:t>
+              <a:t>18</a:t>
             </a:fld>
             <a:endParaRPr lang="en-US"/>
           </a:p>
@@ -1202,7 +1220,7 @@
     </p:spTree>
     <p:extLst>
       <p:ext uri="{BB962C8B-B14F-4D97-AF65-F5344CB8AC3E}">
-        <p14:creationId xmlns:p14="http://schemas.microsoft.com/office/powerpoint/2010/main" val="3414845990"/>
+        <p14:creationId xmlns:p14="http://schemas.microsoft.com/office/powerpoint/2010/main" val="144092768"/>
       </p:ext>
     </p:extLst>
   </p:cSld>
@@ -1277,7 +1295,7 @@
           <a:p>
             <a:fld id="{906AB01E-7BD7-442B-8A6B-D31FAFDAE830}" type="slidenum">
               <a:rPr lang="en-US" smtClean="0"/>
-              <a:t>18</a:t>
+              <a:t>19</a:t>
             </a:fld>
             <a:endParaRPr lang="en-US"/>
           </a:p>
@@ -1286,7 +1304,7 @@
     </p:spTree>
     <p:extLst>
       <p:ext uri="{BB962C8B-B14F-4D97-AF65-F5344CB8AC3E}">
-        <p14:creationId xmlns:p14="http://schemas.microsoft.com/office/powerpoint/2010/main" val="144092768"/>
+        <p14:creationId xmlns:p14="http://schemas.microsoft.com/office/powerpoint/2010/main" val="3018024338"/>
       </p:ext>
     </p:extLst>
   </p:cSld>
@@ -1361,7 +1379,7 @@
           <a:p>
             <a:fld id="{906AB01E-7BD7-442B-8A6B-D31FAFDAE830}" type="slidenum">
               <a:rPr lang="en-US" smtClean="0"/>
-              <a:t>19</a:t>
+              <a:t>20</a:t>
             </a:fld>
             <a:endParaRPr lang="en-US"/>
           </a:p>
@@ -1370,7 +1388,7 @@
     </p:spTree>
     <p:extLst>
       <p:ext uri="{BB962C8B-B14F-4D97-AF65-F5344CB8AC3E}">
-        <p14:creationId xmlns:p14="http://schemas.microsoft.com/office/powerpoint/2010/main" val="3018024338"/>
+        <p14:creationId xmlns:p14="http://schemas.microsoft.com/office/powerpoint/2010/main" val="1149675431"/>
       </p:ext>
     </p:extLst>
   </p:cSld>
@@ -4075,12 +4093,12 @@
       </p:grpSpPr>
       <p:sp>
         <p:nvSpPr>
-          <p:cNvPr id="5" name="Title 4"/>
+          <p:cNvPr id="4" name="Text Placeholder 3"/>
           <p:cNvSpPr>
             <a:spLocks noGrp="1"/>
           </p:cNvSpPr>
           <p:nvPr>
-            <p:ph type="title"/>
+            <p:ph type="body" sz="quarter" idx="10"/>
           </p:nvPr>
         </p:nvSpPr>
         <p:spPr/>
@@ -4089,9 +4107,28 @@
           <a:lstStyle/>
           <a:p>
             <a:r>
-              <a:rPr lang="en-CA" dirty="0" smtClean="0"/>
-              <a:t>What we’ll be building</a:t>
-            </a:r>
+              <a:rPr lang="en-US" dirty="0" smtClean="0"/>
+              <a:t>What is Knockout?</a:t>
+            </a:r>
+            <a:endParaRPr lang="en-US" dirty="0"/>
+          </a:p>
+        </p:txBody>
+      </p:sp>
+      <p:sp>
+        <p:nvSpPr>
+          <p:cNvPr id="3" name="Subtitle 2"/>
+          <p:cNvSpPr>
+            <a:spLocks noGrp="1"/>
+          </p:cNvSpPr>
+          <p:nvPr>
+            <p:ph type="subTitle" idx="1"/>
+          </p:nvPr>
+        </p:nvSpPr>
+        <p:spPr/>
+        <p:txBody>
+          <a:bodyPr/>
+          <a:lstStyle/>
+          <a:p>
             <a:endParaRPr lang="en-US" dirty="0"/>
           </a:p>
         </p:txBody>
@@ -4099,20 +4136,13 @@
     </p:spTree>
     <p:extLst>
       <p:ext uri="{BB962C8B-B14F-4D97-AF65-F5344CB8AC3E}">
-        <p14:creationId xmlns:p14="http://schemas.microsoft.com/office/powerpoint/2010/main" val="757686776"/>
+        <p14:creationId xmlns:p14="http://schemas.microsoft.com/office/powerpoint/2010/main" val="4087148463"/>
       </p:ext>
     </p:extLst>
   </p:cSld>
   <p:clrMapOvr>
     <a:masterClrMapping/>
   </p:clrMapOvr>
-  <p:timing>
-    <p:tnLst>
-      <p:par>
-        <p:cTn id="1" dur="indefinite" restart="never" nodeType="tmRoot"/>
-      </p:par>
-    </p:tnLst>
-  </p:timing>
 </p:sld>
 </file>
 
@@ -4135,12 +4165,12 @@
       </p:grpSpPr>
       <p:sp>
         <p:nvSpPr>
-          <p:cNvPr id="4" name="Text Placeholder 3"/>
+          <p:cNvPr id="4" name="Title 3"/>
           <p:cNvSpPr>
             <a:spLocks noGrp="1"/>
           </p:cNvSpPr>
           <p:nvPr>
-            <p:ph type="body" sz="quarter" idx="10"/>
+            <p:ph type="title"/>
           </p:nvPr>
         </p:nvSpPr>
         <p:spPr/>
@@ -4150,20 +4180,20 @@
           <a:p>
             <a:r>
               <a:rPr lang="en-US" dirty="0" smtClean="0"/>
-              <a:t>What is Knockout?</a:t>
-            </a:r>
-            <a:endParaRPr lang="en-US" dirty="0"/>
-          </a:p>
-        </p:txBody>
-      </p:sp>
-      <p:sp>
-        <p:nvSpPr>
-          <p:cNvPr id="3" name="Subtitle 2"/>
+              <a:t>What Knockout provides</a:t>
+            </a:r>
+            <a:endParaRPr lang="en-US" dirty="0"/>
+          </a:p>
+        </p:txBody>
+      </p:sp>
+      <p:sp>
+        <p:nvSpPr>
+          <p:cNvPr id="5" name="Content Placeholder 4"/>
           <p:cNvSpPr>
             <a:spLocks noGrp="1"/>
           </p:cNvSpPr>
           <p:nvPr>
-            <p:ph type="subTitle" idx="1"/>
+            <p:ph sz="quarter" idx="10"/>
           </p:nvPr>
         </p:nvSpPr>
         <p:spPr/>
@@ -4171,6 +4201,40 @@
           <a:bodyPr/>
           <a:lstStyle/>
           <a:p>
+            <a:r>
+              <a:rPr lang="en-US" dirty="0" smtClean="0"/>
+              <a:t>An MVVM library</a:t>
+            </a:r>
+          </a:p>
+          <a:p>
+            <a:r>
+              <a:rPr lang="en-US" dirty="0" smtClean="0"/>
+              <a:t>Automatic UI refresh and updates</a:t>
+            </a:r>
+          </a:p>
+          <a:p>
+            <a:r>
+              <a:rPr lang="en-US" dirty="0" smtClean="0"/>
+              <a:t>Reusable templates</a:t>
+            </a:r>
+          </a:p>
+          <a:p>
+            <a:r>
+              <a:rPr lang="en-US" dirty="0" smtClean="0"/>
+              <a:t>Can be used with nearly any framework</a:t>
+            </a:r>
+          </a:p>
+          <a:p>
+            <a:r>
+              <a:rPr lang="en-US" dirty="0" smtClean="0"/>
+              <a:t>Focused on data binding</a:t>
+            </a:r>
+          </a:p>
+          <a:p>
+            <a:r>
+              <a:rPr lang="en-US" dirty="0" smtClean="0"/>
+              <a:t>Small library size</a:t>
+            </a:r>
             <a:endParaRPr lang="en-US" dirty="0"/>
           </a:p>
         </p:txBody>
@@ -4178,7 +4242,7 @@
     </p:spTree>
     <p:extLst>
       <p:ext uri="{BB962C8B-B14F-4D97-AF65-F5344CB8AC3E}">
-        <p14:creationId xmlns:p14="http://schemas.microsoft.com/office/powerpoint/2010/main" val="4087148463"/>
+        <p14:creationId xmlns:p14="http://schemas.microsoft.com/office/powerpoint/2010/main" val="1703688459"/>
       </p:ext>
     </p:extLst>
   </p:cSld>
@@ -4207,7 +4271,7 @@
       </p:grpSpPr>
       <p:sp>
         <p:nvSpPr>
-          <p:cNvPr id="4" name="Title 3"/>
+          <p:cNvPr id="2" name="Title 1"/>
           <p:cNvSpPr>
             <a:spLocks noGrp="1"/>
           </p:cNvSpPr>
@@ -4222,15 +4286,15 @@
           <a:p>
             <a:r>
               <a:rPr lang="en-US" dirty="0" smtClean="0"/>
-              <a:t>What Knockout provides</a:t>
-            </a:r>
-            <a:endParaRPr lang="en-US" dirty="0"/>
-          </a:p>
-        </p:txBody>
-      </p:sp>
-      <p:sp>
-        <p:nvSpPr>
-          <p:cNvPr id="5" name="Content Placeholder 4"/>
+              <a:t>What Knockout isn’t</a:t>
+            </a:r>
+            <a:endParaRPr lang="en-US" dirty="0"/>
+          </a:p>
+        </p:txBody>
+      </p:sp>
+      <p:sp>
+        <p:nvSpPr>
+          <p:cNvPr id="3" name="Content Placeholder 2"/>
           <p:cNvSpPr>
             <a:spLocks noGrp="1"/>
           </p:cNvSpPr>
@@ -4245,46 +4309,31 @@
           <a:p>
             <a:r>
               <a:rPr lang="en-US" dirty="0" smtClean="0"/>
-              <a:t>An MVVM library</a:t>
-            </a:r>
-          </a:p>
-          <a:p>
-            <a:r>
-              <a:rPr lang="en-US" dirty="0" smtClean="0"/>
-              <a:t>Automatic UI refresh and updates</a:t>
-            </a:r>
-          </a:p>
-          <a:p>
-            <a:r>
-              <a:rPr lang="en-US" dirty="0" smtClean="0"/>
-              <a:t>Reusable templates</a:t>
-            </a:r>
-          </a:p>
-          <a:p>
-            <a:r>
-              <a:rPr lang="en-US" dirty="0" smtClean="0"/>
-              <a:t>Can be used with nearly any framework</a:t>
-            </a:r>
-          </a:p>
-          <a:p>
-            <a:r>
-              <a:rPr lang="en-US" dirty="0" smtClean="0"/>
-              <a:t>Focused on data binding</a:t>
-            </a:r>
-          </a:p>
-          <a:p>
-            <a:r>
-              <a:rPr lang="en-US" dirty="0" smtClean="0"/>
-              <a:t>Small library size</a:t>
-            </a:r>
-            <a:endParaRPr lang="en-US" dirty="0"/>
+              <a:t>A full framework</a:t>
+            </a:r>
+          </a:p>
+          <a:p>
+            <a:endParaRPr lang="en-US" dirty="0"/>
+          </a:p>
+          <a:p>
+            <a:r>
+              <a:rPr lang="en-US" dirty="0" smtClean="0"/>
+              <a:t>Knockout doesn’t compete with jQuery</a:t>
+            </a:r>
+          </a:p>
+          <a:p>
+            <a:pPr lvl="1"/>
+            <a:r>
+              <a:rPr lang="en-US" dirty="0" smtClean="0"/>
+              <a:t>Still use jQuery for Ajax calls and effects</a:t>
+            </a:r>
           </a:p>
         </p:txBody>
       </p:sp>
     </p:spTree>
     <p:extLst>
       <p:ext uri="{BB962C8B-B14F-4D97-AF65-F5344CB8AC3E}">
-        <p14:creationId xmlns:p14="http://schemas.microsoft.com/office/powerpoint/2010/main" val="1703688459"/>
+        <p14:creationId xmlns:p14="http://schemas.microsoft.com/office/powerpoint/2010/main" val="2928231689"/>
       </p:ext>
     </p:extLst>
   </p:cSld>
@@ -4328,7 +4377,7 @@
           <a:p>
             <a:r>
               <a:rPr lang="en-US" dirty="0" smtClean="0"/>
-              <a:t>What Knockout isn’t</a:t>
+              <a:t>What is MVVM?</a:t>
             </a:r>
             <a:endParaRPr lang="en-US" dirty="0"/>
           </a:p>
@@ -4351,31 +4400,68 @@
           <a:p>
             <a:r>
               <a:rPr lang="en-US" dirty="0" smtClean="0"/>
-              <a:t>A full framework</a:t>
-            </a:r>
-          </a:p>
-          <a:p>
-            <a:endParaRPr lang="en-US" dirty="0"/>
-          </a:p>
-          <a:p>
-            <a:r>
-              <a:rPr lang="en-US" dirty="0" smtClean="0"/>
-              <a:t>Knockout doesn’t compete with jQuery</a:t>
+              <a:t>Model</a:t>
             </a:r>
           </a:p>
           <a:p>
             <a:pPr lvl="1"/>
             <a:r>
               <a:rPr lang="en-US" dirty="0" smtClean="0"/>
-              <a:t>Still use jQuery for Ajax calls and effects</a:t>
-            </a:r>
+              <a:t>Domain model (or data access layer)</a:t>
+            </a:r>
+          </a:p>
+          <a:p>
+            <a:r>
+              <a:rPr lang="en-US" dirty="0" smtClean="0"/>
+              <a:t>View</a:t>
+            </a:r>
+          </a:p>
+          <a:p>
+            <a:pPr lvl="1"/>
+            <a:r>
+              <a:rPr lang="en-US" dirty="0" smtClean="0"/>
+              <a:t>The display the user will see</a:t>
+            </a:r>
+          </a:p>
+          <a:p>
+            <a:r>
+              <a:rPr lang="en-US" dirty="0" smtClean="0"/>
+              <a:t>View model</a:t>
+            </a:r>
+          </a:p>
+          <a:p>
+            <a:pPr lvl="1"/>
+            <a:r>
+              <a:rPr lang="en-US" dirty="0" smtClean="0"/>
+              <a:t>The data the user will </a:t>
+            </a:r>
+            <a:r>
+              <a:rPr lang="en-US" dirty="0" smtClean="0"/>
+              <a:t>see</a:t>
+            </a:r>
+          </a:p>
+          <a:p>
+            <a:pPr lvl="1"/>
+            <a:r>
+              <a:rPr lang="en-US" dirty="0" smtClean="0"/>
+              <a:t>A “pure-code </a:t>
+            </a:r>
+            <a:r>
+              <a:rPr lang="en-US" dirty="0"/>
+              <a:t>representation of the data and operations on a </a:t>
+            </a:r>
+            <a:r>
+              <a:rPr lang="en-US" dirty="0" smtClean="0"/>
+              <a:t>UI”</a:t>
+            </a:r>
+            <a:endParaRPr lang="en-US" dirty="0"/>
           </a:p>
         </p:txBody>
       </p:sp>
     </p:spTree>
     <p:extLst>
       <p:ext uri="{BB962C8B-B14F-4D97-AF65-F5344CB8AC3E}">
-        <p14:creationId xmlns:p14="http://schemas.microsoft.com/office/powerpoint/2010/main" val="2928231689"/>
+        <p14:creationId xmlns:p14="http://schemas.microsoft.com/office/powerpoint/2010/main" val="663136493"/>
       </p:ext>
     </p:extLst>
   </p:cSld>
@@ -4419,63 +4505,626 @@
           <a:p>
             <a:r>
               <a:rPr lang="en-US" dirty="0" smtClean="0"/>
-              <a:t>What is MVVM?</a:t>
-            </a:r>
-            <a:endParaRPr lang="en-US" dirty="0"/>
-          </a:p>
-        </p:txBody>
-      </p:sp>
-      <p:sp>
-        <p:nvSpPr>
-          <p:cNvPr id="3" name="Content Placeholder 2"/>
-          <p:cNvSpPr>
-            <a:spLocks noGrp="1"/>
-          </p:cNvSpPr>
-          <p:nvPr>
-            <p:ph sz="quarter" idx="10"/>
-          </p:nvPr>
-        </p:nvSpPr>
-        <p:spPr/>
-        <p:txBody>
-          <a:bodyPr/>
+              <a:t>MVVM in pictures</a:t>
+            </a:r>
+            <a:endParaRPr lang="en-US" dirty="0"/>
+          </a:p>
+        </p:txBody>
+      </p:sp>
+      <p:sp>
+        <p:nvSpPr>
+          <p:cNvPr id="4" name="Rounded Rectangle 3"/>
+          <p:cNvSpPr/>
+          <p:nvPr/>
+        </p:nvSpPr>
+        <p:spPr>
+          <a:xfrm>
+            <a:off x="379514" y="2637418"/>
+            <a:ext cx="3679115" cy="2173044"/>
+          </a:xfrm>
+          <a:prstGeom prst="roundRect">
+            <a:avLst>
+              <a:gd name="adj" fmla="val 11262"/>
+            </a:avLst>
+          </a:prstGeom>
+        </p:spPr>
+        <p:style>
+          <a:lnRef idx="1">
+            <a:schemeClr val="accent4"/>
+          </a:lnRef>
+          <a:fillRef idx="2">
+            <a:schemeClr val="accent4"/>
+          </a:fillRef>
+          <a:effectRef idx="1">
+            <a:schemeClr val="accent4"/>
+          </a:effectRef>
+          <a:fontRef idx="minor">
+            <a:schemeClr val="dk1"/>
+          </a:fontRef>
+        </p:style>
+        <p:txBody>
+          <a:bodyPr rtlCol="0" anchor="ctr"/>
           <a:lstStyle/>
           <a:p>
-            <a:r>
-              <a:rPr lang="en-US" dirty="0" smtClean="0"/>
+            <a:pPr algn="ctr"/>
+            <a:r>
+              <a:rPr lang="en-US" b="1" dirty="0" smtClean="0"/>
+              <a:t>View</a:t>
+            </a:r>
+          </a:p>
+          <a:p>
+            <a:pPr algn="ctr"/>
+            <a:endParaRPr lang="en-US" dirty="0"/>
+          </a:p>
+          <a:p>
+            <a:pPr algn="ctr"/>
+            <a:endParaRPr lang="en-US" dirty="0" smtClean="0"/>
+          </a:p>
+          <a:p>
+            <a:pPr algn="ctr"/>
+            <a:endParaRPr lang="en-US" dirty="0"/>
+          </a:p>
+          <a:p>
+            <a:pPr algn="ctr"/>
+            <a:endParaRPr lang="en-US" dirty="0" smtClean="0"/>
+          </a:p>
+          <a:p>
+            <a:pPr algn="ctr"/>
+            <a:endParaRPr lang="en-US" dirty="0"/>
+          </a:p>
+          <a:p>
+            <a:pPr algn="ctr"/>
+            <a:endParaRPr lang="en-US" dirty="0"/>
+          </a:p>
+        </p:txBody>
+      </p:sp>
+      <p:sp>
+        <p:nvSpPr>
+          <p:cNvPr id="5" name="Rounded Rectangle 4"/>
+          <p:cNvSpPr/>
+          <p:nvPr/>
+        </p:nvSpPr>
+        <p:spPr>
+          <a:xfrm>
+            <a:off x="938911" y="3196816"/>
+            <a:ext cx="2689411" cy="527124"/>
+          </a:xfrm>
+          <a:prstGeom prst="roundRect">
+            <a:avLst/>
+          </a:prstGeom>
+        </p:spPr>
+        <p:style>
+          <a:lnRef idx="0">
+            <a:schemeClr val="accent4"/>
+          </a:lnRef>
+          <a:fillRef idx="3">
+            <a:schemeClr val="accent4"/>
+          </a:fillRef>
+          <a:effectRef idx="3">
+            <a:schemeClr val="accent4"/>
+          </a:effectRef>
+          <a:fontRef idx="minor">
+            <a:schemeClr val="lt1"/>
+          </a:fontRef>
+        </p:style>
+        <p:txBody>
+          <a:bodyPr rtlCol="0" anchor="ctr"/>
+          <a:lstStyle/>
+          <a:p>
+            <a:pPr algn="ctr"/>
+            <a:r>
+              <a:rPr lang="en-US" dirty="0" smtClean="0"/>
+              <a:t>Name</a:t>
+            </a:r>
+            <a:endParaRPr lang="en-US" dirty="0"/>
+          </a:p>
+        </p:txBody>
+      </p:sp>
+      <p:sp>
+        <p:nvSpPr>
+          <p:cNvPr id="6" name="Rounded Rectangle 5"/>
+          <p:cNvSpPr/>
+          <p:nvPr/>
+        </p:nvSpPr>
+        <p:spPr>
+          <a:xfrm>
+            <a:off x="938912" y="3955228"/>
+            <a:ext cx="2689411" cy="527124"/>
+          </a:xfrm>
+          <a:prstGeom prst="roundRect">
+            <a:avLst/>
+          </a:prstGeom>
+        </p:spPr>
+        <p:style>
+          <a:lnRef idx="0">
+            <a:schemeClr val="accent4"/>
+          </a:lnRef>
+          <a:fillRef idx="3">
+            <a:schemeClr val="accent4"/>
+          </a:fillRef>
+          <a:effectRef idx="3">
+            <a:schemeClr val="accent4"/>
+          </a:effectRef>
+          <a:fontRef idx="minor">
+            <a:schemeClr val="lt1"/>
+          </a:fontRef>
+        </p:style>
+        <p:txBody>
+          <a:bodyPr rtlCol="0" anchor="ctr"/>
+          <a:lstStyle/>
+          <a:p>
+            <a:pPr algn="ctr"/>
+            <a:r>
+              <a:rPr lang="en-US" dirty="0" smtClean="0"/>
+              <a:t>Email</a:t>
+            </a:r>
+            <a:endParaRPr lang="en-US" dirty="0"/>
+          </a:p>
+        </p:txBody>
+      </p:sp>
+      <p:sp>
+        <p:nvSpPr>
+          <p:cNvPr id="7" name="Rounded Rectangle 6"/>
+          <p:cNvSpPr/>
+          <p:nvPr/>
+        </p:nvSpPr>
+        <p:spPr>
+          <a:xfrm>
+            <a:off x="4393012" y="2637418"/>
+            <a:ext cx="3679115" cy="2173044"/>
+          </a:xfrm>
+          <a:prstGeom prst="roundRect">
+            <a:avLst>
+              <a:gd name="adj" fmla="val 11262"/>
+            </a:avLst>
+          </a:prstGeom>
+        </p:spPr>
+        <p:style>
+          <a:lnRef idx="1">
+            <a:schemeClr val="accent3"/>
+          </a:lnRef>
+          <a:fillRef idx="2">
+            <a:schemeClr val="accent3"/>
+          </a:fillRef>
+          <a:effectRef idx="1">
+            <a:schemeClr val="accent3"/>
+          </a:effectRef>
+          <a:fontRef idx="minor">
+            <a:schemeClr val="dk1"/>
+          </a:fontRef>
+        </p:style>
+        <p:txBody>
+          <a:bodyPr rtlCol="0" anchor="ctr"/>
+          <a:lstStyle/>
+          <a:p>
+            <a:pPr algn="ctr"/>
+            <a:r>
+              <a:rPr lang="en-US" b="1" dirty="0" smtClean="0"/>
+              <a:t>View Model</a:t>
+            </a:r>
+          </a:p>
+          <a:p>
+            <a:pPr algn="ctr"/>
+            <a:endParaRPr lang="en-US" dirty="0"/>
+          </a:p>
+          <a:p>
+            <a:pPr algn="ctr"/>
+            <a:endParaRPr lang="en-US" dirty="0" smtClean="0"/>
+          </a:p>
+          <a:p>
+            <a:pPr algn="ctr"/>
+            <a:endParaRPr lang="en-US" dirty="0"/>
+          </a:p>
+          <a:p>
+            <a:pPr algn="ctr"/>
+            <a:endParaRPr lang="en-US" dirty="0" smtClean="0"/>
+          </a:p>
+          <a:p>
+            <a:pPr algn="ctr"/>
+            <a:endParaRPr lang="en-US" dirty="0"/>
+          </a:p>
+          <a:p>
+            <a:pPr algn="ctr"/>
+            <a:endParaRPr lang="en-US" dirty="0"/>
+          </a:p>
+        </p:txBody>
+      </p:sp>
+      <p:sp>
+        <p:nvSpPr>
+          <p:cNvPr id="8" name="Rounded Rectangle 7"/>
+          <p:cNvSpPr/>
+          <p:nvPr/>
+        </p:nvSpPr>
+        <p:spPr>
+          <a:xfrm>
+            <a:off x="4920136" y="3196816"/>
+            <a:ext cx="2689411" cy="527124"/>
+          </a:xfrm>
+          <a:prstGeom prst="roundRect">
+            <a:avLst/>
+          </a:prstGeom>
+        </p:spPr>
+        <p:style>
+          <a:lnRef idx="0">
+            <a:schemeClr val="accent3"/>
+          </a:lnRef>
+          <a:fillRef idx="3">
+            <a:schemeClr val="accent3"/>
+          </a:fillRef>
+          <a:effectRef idx="3">
+            <a:schemeClr val="accent3"/>
+          </a:effectRef>
+          <a:fontRef idx="minor">
+            <a:schemeClr val="lt1"/>
+          </a:fontRef>
+        </p:style>
+        <p:txBody>
+          <a:bodyPr rtlCol="0" anchor="ctr"/>
+          <a:lstStyle/>
+          <a:p>
+            <a:pPr algn="ctr"/>
+            <a:r>
+              <a:rPr lang="en-US" dirty="0" smtClean="0"/>
+              <a:t>Name</a:t>
+            </a:r>
+            <a:endParaRPr lang="en-US" dirty="0"/>
+          </a:p>
+        </p:txBody>
+      </p:sp>
+      <p:sp>
+        <p:nvSpPr>
+          <p:cNvPr id="9" name="Rounded Rectangle 8"/>
+          <p:cNvSpPr/>
+          <p:nvPr/>
+        </p:nvSpPr>
+        <p:spPr>
+          <a:xfrm>
+            <a:off x="4920137" y="3955228"/>
+            <a:ext cx="2689411" cy="527124"/>
+          </a:xfrm>
+          <a:prstGeom prst="roundRect">
+            <a:avLst/>
+          </a:prstGeom>
+        </p:spPr>
+        <p:style>
+          <a:lnRef idx="0">
+            <a:schemeClr val="accent3"/>
+          </a:lnRef>
+          <a:fillRef idx="3">
+            <a:schemeClr val="accent3"/>
+          </a:fillRef>
+          <a:effectRef idx="3">
+            <a:schemeClr val="accent3"/>
+          </a:effectRef>
+          <a:fontRef idx="minor">
+            <a:schemeClr val="lt1"/>
+          </a:fontRef>
+        </p:style>
+        <p:txBody>
+          <a:bodyPr rtlCol="0" anchor="ctr"/>
+          <a:lstStyle/>
+          <a:p>
+            <a:pPr algn="ctr"/>
+            <a:r>
+              <a:rPr lang="en-US" dirty="0" smtClean="0"/>
+              <a:t>Email</a:t>
+            </a:r>
+            <a:endParaRPr lang="en-US" dirty="0"/>
+          </a:p>
+        </p:txBody>
+      </p:sp>
+      <p:sp>
+        <p:nvSpPr>
+          <p:cNvPr id="10" name="Rounded Rectangle 9"/>
+          <p:cNvSpPr/>
+          <p:nvPr/>
+        </p:nvSpPr>
+        <p:spPr>
+          <a:xfrm>
+            <a:off x="8406510" y="1647714"/>
+            <a:ext cx="3679115" cy="4152452"/>
+          </a:xfrm>
+          <a:prstGeom prst="roundRect">
+            <a:avLst>
+              <a:gd name="adj" fmla="val 11262"/>
+            </a:avLst>
+          </a:prstGeom>
+        </p:spPr>
+        <p:style>
+          <a:lnRef idx="1">
+            <a:schemeClr val="accent5"/>
+          </a:lnRef>
+          <a:fillRef idx="2">
+            <a:schemeClr val="accent5"/>
+          </a:fillRef>
+          <a:effectRef idx="1">
+            <a:schemeClr val="accent5"/>
+          </a:effectRef>
+          <a:fontRef idx="minor">
+            <a:schemeClr val="dk1"/>
+          </a:fontRef>
+        </p:style>
+        <p:txBody>
+          <a:bodyPr rtlCol="0" anchor="ctr"/>
+          <a:lstStyle/>
+          <a:p>
+            <a:pPr algn="ctr"/>
+            <a:r>
+              <a:rPr lang="en-US" b="1" dirty="0" smtClean="0"/>
               <a:t>Model</a:t>
             </a:r>
           </a:p>
           <a:p>
-            <a:pPr lvl="1"/>
-            <a:r>
-              <a:rPr lang="en-US" dirty="0" smtClean="0"/>
-              <a:t>Domain model (or data access layer)</a:t>
-            </a:r>
-          </a:p>
-          <a:p>
-            <a:r>
-              <a:rPr lang="en-US" dirty="0" smtClean="0"/>
-              <a:t>View</a:t>
-            </a:r>
-          </a:p>
-          <a:p>
-            <a:pPr lvl="1"/>
-            <a:r>
-              <a:rPr lang="en-US" dirty="0" smtClean="0"/>
-              <a:t>The display the user will see</a:t>
-            </a:r>
-          </a:p>
-          <a:p>
-            <a:r>
-              <a:rPr lang="en-US" dirty="0" smtClean="0"/>
-              <a:t>View model</a:t>
-            </a:r>
-          </a:p>
-          <a:p>
-            <a:pPr lvl="1"/>
-            <a:r>
-              <a:rPr lang="en-US" dirty="0" smtClean="0"/>
-              <a:t>The data the user will see</a:t>
+            <a:pPr algn="ctr"/>
+            <a:endParaRPr lang="en-US" b="1" dirty="0"/>
+          </a:p>
+          <a:p>
+            <a:pPr algn="ctr"/>
+            <a:endParaRPr lang="en-US" b="1" dirty="0" smtClean="0"/>
+          </a:p>
+          <a:p>
+            <a:pPr algn="ctr"/>
+            <a:endParaRPr lang="en-US" b="1" dirty="0"/>
+          </a:p>
+          <a:p>
+            <a:pPr algn="ctr"/>
+            <a:endParaRPr lang="en-US" b="1" dirty="0" smtClean="0"/>
+          </a:p>
+          <a:p>
+            <a:pPr algn="ctr"/>
+            <a:endParaRPr lang="en-US" b="1" dirty="0"/>
+          </a:p>
+          <a:p>
+            <a:pPr algn="ctr"/>
+            <a:endParaRPr lang="en-US" b="1" dirty="0" smtClean="0"/>
+          </a:p>
+          <a:p>
+            <a:pPr algn="ctr"/>
+            <a:endParaRPr lang="en-US" b="1" dirty="0"/>
+          </a:p>
+          <a:p>
+            <a:pPr algn="ctr"/>
+            <a:endParaRPr lang="en-US" b="1" dirty="0" smtClean="0"/>
+          </a:p>
+          <a:p>
+            <a:pPr algn="ctr"/>
+            <a:endParaRPr lang="en-US" dirty="0"/>
+          </a:p>
+          <a:p>
+            <a:pPr algn="ctr"/>
+            <a:endParaRPr lang="en-US" dirty="0" smtClean="0"/>
+          </a:p>
+          <a:p>
+            <a:pPr algn="ctr"/>
+            <a:endParaRPr lang="en-US" dirty="0"/>
+          </a:p>
+          <a:p>
+            <a:pPr algn="ctr"/>
+            <a:endParaRPr lang="en-US" dirty="0" smtClean="0"/>
+          </a:p>
+          <a:p>
+            <a:pPr algn="ctr"/>
+            <a:endParaRPr lang="en-US" dirty="0"/>
+          </a:p>
+          <a:p>
+            <a:pPr algn="ctr"/>
+            <a:endParaRPr lang="en-US" dirty="0"/>
+          </a:p>
+        </p:txBody>
+      </p:sp>
+      <p:sp>
+        <p:nvSpPr>
+          <p:cNvPr id="11" name="Rounded Rectangle 10"/>
+          <p:cNvSpPr/>
+          <p:nvPr/>
+        </p:nvSpPr>
+        <p:spPr>
+          <a:xfrm>
+            <a:off x="8901361" y="2230422"/>
+            <a:ext cx="2689411" cy="527124"/>
+          </a:xfrm>
+          <a:prstGeom prst="roundRect">
+            <a:avLst/>
+          </a:prstGeom>
+        </p:spPr>
+        <p:style>
+          <a:lnRef idx="0">
+            <a:schemeClr val="accent5"/>
+          </a:lnRef>
+          <a:fillRef idx="3">
+            <a:schemeClr val="accent5"/>
+          </a:fillRef>
+          <a:effectRef idx="3">
+            <a:schemeClr val="accent5"/>
+          </a:effectRef>
+          <a:fontRef idx="minor">
+            <a:schemeClr val="lt1"/>
+          </a:fontRef>
+        </p:style>
+        <p:txBody>
+          <a:bodyPr rtlCol="0" anchor="ctr"/>
+          <a:lstStyle/>
+          <a:p>
+            <a:pPr algn="ctr"/>
+            <a:r>
+              <a:rPr lang="en-US" dirty="0" err="1" smtClean="0"/>
+              <a:t>FirstName</a:t>
+            </a:r>
+            <a:endParaRPr lang="en-US" dirty="0"/>
+          </a:p>
+        </p:txBody>
+      </p:sp>
+      <p:sp>
+        <p:nvSpPr>
+          <p:cNvPr id="12" name="Rounded Rectangle 11"/>
+          <p:cNvSpPr/>
+          <p:nvPr/>
+        </p:nvSpPr>
+        <p:spPr>
+          <a:xfrm>
+            <a:off x="8901360" y="3568851"/>
+            <a:ext cx="2689411" cy="527124"/>
+          </a:xfrm>
+          <a:prstGeom prst="roundRect">
+            <a:avLst/>
+          </a:prstGeom>
+        </p:spPr>
+        <p:style>
+          <a:lnRef idx="0">
+            <a:schemeClr val="accent5"/>
+          </a:lnRef>
+          <a:fillRef idx="3">
+            <a:schemeClr val="accent5"/>
+          </a:fillRef>
+          <a:effectRef idx="3">
+            <a:schemeClr val="accent5"/>
+          </a:effectRef>
+          <a:fontRef idx="minor">
+            <a:schemeClr val="lt1"/>
+          </a:fontRef>
+        </p:style>
+        <p:txBody>
+          <a:bodyPr rtlCol="0" anchor="ctr"/>
+          <a:lstStyle/>
+          <a:p>
+            <a:pPr algn="ctr"/>
+            <a:r>
+              <a:rPr lang="en-US" dirty="0" smtClean="0"/>
+              <a:t>Email</a:t>
+            </a:r>
+            <a:endParaRPr lang="en-US" dirty="0"/>
+          </a:p>
+        </p:txBody>
+      </p:sp>
+      <p:sp>
+        <p:nvSpPr>
+          <p:cNvPr id="13" name="Rounded Rectangle 12"/>
+          <p:cNvSpPr/>
+          <p:nvPr/>
+        </p:nvSpPr>
+        <p:spPr>
+          <a:xfrm>
+            <a:off x="8901360" y="2899636"/>
+            <a:ext cx="2689411" cy="527124"/>
+          </a:xfrm>
+          <a:prstGeom prst="roundRect">
+            <a:avLst/>
+          </a:prstGeom>
+        </p:spPr>
+        <p:style>
+          <a:lnRef idx="0">
+            <a:schemeClr val="accent5"/>
+          </a:lnRef>
+          <a:fillRef idx="3">
+            <a:schemeClr val="accent5"/>
+          </a:fillRef>
+          <a:effectRef idx="3">
+            <a:schemeClr val="accent5"/>
+          </a:effectRef>
+          <a:fontRef idx="minor">
+            <a:schemeClr val="lt1"/>
+          </a:fontRef>
+        </p:style>
+        <p:txBody>
+          <a:bodyPr rtlCol="0" anchor="ctr"/>
+          <a:lstStyle/>
+          <a:p>
+            <a:pPr algn="ctr"/>
+            <a:r>
+              <a:rPr lang="en-US" dirty="0" err="1" smtClean="0"/>
+              <a:t>LastName</a:t>
+            </a:r>
+            <a:endParaRPr lang="en-US" dirty="0"/>
+          </a:p>
+        </p:txBody>
+      </p:sp>
+      <p:sp>
+        <p:nvSpPr>
+          <p:cNvPr id="14" name="Rounded Rectangle 13"/>
+          <p:cNvSpPr/>
+          <p:nvPr/>
+        </p:nvSpPr>
+        <p:spPr>
+          <a:xfrm>
+            <a:off x="8901359" y="4234480"/>
+            <a:ext cx="2689411" cy="527124"/>
+          </a:xfrm>
+          <a:prstGeom prst="roundRect">
+            <a:avLst/>
+          </a:prstGeom>
+        </p:spPr>
+        <p:style>
+          <a:lnRef idx="0">
+            <a:schemeClr val="accent5"/>
+          </a:lnRef>
+          <a:fillRef idx="3">
+            <a:schemeClr val="accent5"/>
+          </a:fillRef>
+          <a:effectRef idx="3">
+            <a:schemeClr val="accent5"/>
+          </a:effectRef>
+          <a:fontRef idx="minor">
+            <a:schemeClr val="lt1"/>
+          </a:fontRef>
+        </p:style>
+        <p:txBody>
+          <a:bodyPr rtlCol="0" anchor="ctr"/>
+          <a:lstStyle/>
+          <a:p>
+            <a:pPr algn="ctr"/>
+            <a:r>
+              <a:rPr lang="en-US" dirty="0" err="1" smtClean="0"/>
+              <a:t>LoadUser</a:t>
+            </a:r>
+            <a:r>
+              <a:rPr lang="en-US" dirty="0" smtClean="0"/>
+              <a:t>()</a:t>
+            </a:r>
+            <a:endParaRPr lang="en-US" dirty="0"/>
+          </a:p>
+        </p:txBody>
+      </p:sp>
+      <p:sp>
+        <p:nvSpPr>
+          <p:cNvPr id="15" name="Rounded Rectangle 14"/>
+          <p:cNvSpPr/>
+          <p:nvPr/>
+        </p:nvSpPr>
+        <p:spPr>
+          <a:xfrm>
+            <a:off x="8901359" y="4900109"/>
+            <a:ext cx="2689411" cy="527124"/>
+          </a:xfrm>
+          <a:prstGeom prst="roundRect">
+            <a:avLst/>
+          </a:prstGeom>
+        </p:spPr>
+        <p:style>
+          <a:lnRef idx="0">
+            <a:schemeClr val="accent5"/>
+          </a:lnRef>
+          <a:fillRef idx="3">
+            <a:schemeClr val="accent5"/>
+          </a:fillRef>
+          <a:effectRef idx="3">
+            <a:schemeClr val="accent5"/>
+          </a:effectRef>
+          <a:fontRef idx="minor">
+            <a:schemeClr val="lt1"/>
+          </a:fontRef>
+        </p:style>
+        <p:txBody>
+          <a:bodyPr rtlCol="0" anchor="ctr"/>
+          <a:lstStyle/>
+          <a:p>
+            <a:pPr algn="ctr"/>
+            <a:r>
+              <a:rPr lang="en-US" dirty="0" err="1" smtClean="0"/>
+              <a:t>SaveUser</a:t>
+            </a:r>
+            <a:r>
+              <a:rPr lang="en-US" dirty="0" smtClean="0"/>
+              <a:t>()</a:t>
             </a:r>
             <a:endParaRPr lang="en-US" dirty="0"/>
           </a:p>
@@ -4484,7 +5133,7 @@
     </p:spTree>
     <p:extLst>
       <p:ext uri="{BB962C8B-B14F-4D97-AF65-F5344CB8AC3E}">
-        <p14:creationId xmlns:p14="http://schemas.microsoft.com/office/powerpoint/2010/main" val="663136493"/>
+        <p14:creationId xmlns:p14="http://schemas.microsoft.com/office/powerpoint/2010/main" val="17314703"/>
       </p:ext>
     </p:extLst>
   </p:cSld>
@@ -4637,7 +5286,7 @@
             <a:pPr algn="ctr"/>
             <a:r>
               <a:rPr lang="en-US" dirty="0" smtClean="0"/>
-              <a:t>Name</a:t>
+              <a:t>Developer</a:t>
             </a:r>
             <a:endParaRPr lang="en-US" dirty="0"/>
           </a:p>
@@ -4679,7 +5328,7 @@
             <a:pPr algn="ctr"/>
             <a:r>
               <a:rPr lang="en-US" dirty="0" smtClean="0"/>
-              <a:t>Email</a:t>
+              <a:t>Bugs</a:t>
             </a:r>
             <a:endParaRPr lang="en-US" dirty="0"/>
           </a:p>
@@ -4788,7 +5437,7 @@
             <a:pPr algn="ctr"/>
             <a:r>
               <a:rPr lang="en-US" dirty="0" smtClean="0"/>
-              <a:t>Name</a:t>
+              <a:t>Developer</a:t>
             </a:r>
             <a:endParaRPr lang="en-US" dirty="0"/>
           </a:p>
@@ -4830,333 +5479,552 @@
             <a:pPr algn="ctr"/>
             <a:r>
               <a:rPr lang="en-US" dirty="0" smtClean="0"/>
-              <a:t>Email</a:t>
-            </a:r>
-            <a:endParaRPr lang="en-US" dirty="0"/>
-          </a:p>
-        </p:txBody>
-      </p:sp>
-      <p:sp>
-        <p:nvSpPr>
-          <p:cNvPr id="10" name="Rounded Rectangle 9"/>
-          <p:cNvSpPr/>
+              <a:t>Bugs[]</a:t>
+            </a:r>
+            <a:endParaRPr lang="en-US" dirty="0"/>
+          </a:p>
+        </p:txBody>
+      </p:sp>
+      <p:grpSp>
+        <p:nvGrpSpPr>
+          <p:cNvPr id="38" name="Group 37"/>
+          <p:cNvGrpSpPr/>
           <p:nvPr/>
-        </p:nvSpPr>
-        <p:spPr>
+        </p:nvGrpSpPr>
+        <p:grpSpPr>
           <a:xfrm>
-            <a:off x="8406510" y="1647714"/>
-            <a:ext cx="3679115" cy="4152452"/>
+            <a:off x="8512885" y="3506254"/>
+            <a:ext cx="3391061" cy="3194348"/>
+            <a:chOff x="6297113" y="561192"/>
+            <a:chExt cx="3679115" cy="3481086"/>
           </a:xfrm>
-          <a:prstGeom prst="roundRect">
-            <a:avLst>
-              <a:gd name="adj" fmla="val 11262"/>
-            </a:avLst>
-          </a:prstGeom>
-        </p:spPr>
-        <p:style>
-          <a:lnRef idx="1">
-            <a:schemeClr val="accent5"/>
-          </a:lnRef>
-          <a:fillRef idx="2">
-            <a:schemeClr val="accent5"/>
-          </a:fillRef>
-          <a:effectRef idx="1">
-            <a:schemeClr val="accent5"/>
-          </a:effectRef>
-          <a:fontRef idx="minor">
-            <a:schemeClr val="dk1"/>
-          </a:fontRef>
-        </p:style>
-        <p:txBody>
-          <a:bodyPr rtlCol="0" anchor="ctr"/>
-          <a:lstStyle/>
-          <a:p>
-            <a:pPr algn="ctr"/>
-            <a:r>
-              <a:rPr lang="en-US" b="1" dirty="0" smtClean="0"/>
-              <a:t>Model</a:t>
-            </a:r>
-          </a:p>
-          <a:p>
-            <a:pPr algn="ctr"/>
-            <a:endParaRPr lang="en-US" b="1" dirty="0"/>
-          </a:p>
-          <a:p>
-            <a:pPr algn="ctr"/>
-            <a:endParaRPr lang="en-US" b="1" dirty="0" smtClean="0"/>
-          </a:p>
-          <a:p>
-            <a:pPr algn="ctr"/>
-            <a:endParaRPr lang="en-US" b="1" dirty="0"/>
-          </a:p>
-          <a:p>
-            <a:pPr algn="ctr"/>
-            <a:endParaRPr lang="en-US" b="1" dirty="0" smtClean="0"/>
-          </a:p>
-          <a:p>
-            <a:pPr algn="ctr"/>
-            <a:endParaRPr lang="en-US" b="1" dirty="0"/>
-          </a:p>
-          <a:p>
-            <a:pPr algn="ctr"/>
-            <a:endParaRPr lang="en-US" b="1" dirty="0" smtClean="0"/>
-          </a:p>
-          <a:p>
-            <a:pPr algn="ctr"/>
-            <a:endParaRPr lang="en-US" b="1" dirty="0"/>
-          </a:p>
-          <a:p>
-            <a:pPr algn="ctr"/>
-            <a:endParaRPr lang="en-US" b="1" dirty="0" smtClean="0"/>
-          </a:p>
-          <a:p>
-            <a:pPr algn="ctr"/>
-            <a:endParaRPr lang="en-US" dirty="0"/>
-          </a:p>
-          <a:p>
-            <a:pPr algn="ctr"/>
-            <a:endParaRPr lang="en-US" dirty="0" smtClean="0"/>
-          </a:p>
-          <a:p>
-            <a:pPr algn="ctr"/>
-            <a:endParaRPr lang="en-US" dirty="0"/>
-          </a:p>
-          <a:p>
-            <a:pPr algn="ctr"/>
-            <a:endParaRPr lang="en-US" dirty="0" smtClean="0"/>
-          </a:p>
-          <a:p>
-            <a:pPr algn="ctr"/>
-            <a:endParaRPr lang="en-US" dirty="0"/>
-          </a:p>
-          <a:p>
-            <a:pPr algn="ctr"/>
-            <a:endParaRPr lang="en-US" dirty="0"/>
-          </a:p>
-        </p:txBody>
-      </p:sp>
-      <p:sp>
-        <p:nvSpPr>
-          <p:cNvPr id="11" name="Rounded Rectangle 10"/>
-          <p:cNvSpPr/>
+        </p:grpSpPr>
+        <p:sp>
+          <p:nvSpPr>
+            <p:cNvPr id="10" name="Rounded Rectangle 9"/>
+            <p:cNvSpPr/>
+            <p:nvPr/>
+          </p:nvSpPr>
+          <p:spPr>
+            <a:xfrm>
+              <a:off x="6297113" y="561192"/>
+              <a:ext cx="3679115" cy="3481086"/>
+            </a:xfrm>
+            <a:prstGeom prst="roundRect">
+              <a:avLst>
+                <a:gd name="adj" fmla="val 11262"/>
+              </a:avLst>
+            </a:prstGeom>
+          </p:spPr>
+          <p:style>
+            <a:lnRef idx="1">
+              <a:schemeClr val="accent5"/>
+            </a:lnRef>
+            <a:fillRef idx="2">
+              <a:schemeClr val="accent5"/>
+            </a:fillRef>
+            <a:effectRef idx="1">
+              <a:schemeClr val="accent5"/>
+            </a:effectRef>
+            <a:fontRef idx="minor">
+              <a:schemeClr val="dk1"/>
+            </a:fontRef>
+          </p:style>
+          <p:txBody>
+            <a:bodyPr rtlCol="0" anchor="ctr"/>
+            <a:lstStyle/>
+            <a:p>
+              <a:pPr algn="ctr"/>
+              <a:r>
+                <a:rPr lang="en-US" b="1" dirty="0" smtClean="0"/>
+                <a:t>Bug Model</a:t>
+              </a:r>
+            </a:p>
+            <a:p>
+              <a:pPr algn="ctr"/>
+              <a:endParaRPr lang="en-US" b="1" dirty="0"/>
+            </a:p>
+            <a:p>
+              <a:pPr algn="ctr"/>
+              <a:endParaRPr lang="en-US" b="1" dirty="0" smtClean="0"/>
+            </a:p>
+            <a:p>
+              <a:pPr algn="ctr"/>
+              <a:endParaRPr lang="en-US" b="1" dirty="0"/>
+            </a:p>
+            <a:p>
+              <a:pPr algn="ctr"/>
+              <a:endParaRPr lang="en-US" b="1" dirty="0" smtClean="0"/>
+            </a:p>
+            <a:p>
+              <a:pPr algn="ctr"/>
+              <a:endParaRPr lang="en-US" dirty="0"/>
+            </a:p>
+            <a:p>
+              <a:pPr algn="ctr"/>
+              <a:endParaRPr lang="en-US" dirty="0" smtClean="0"/>
+            </a:p>
+            <a:p>
+              <a:pPr algn="ctr"/>
+              <a:endParaRPr lang="en-US" dirty="0"/>
+            </a:p>
+            <a:p>
+              <a:pPr algn="ctr"/>
+              <a:endParaRPr lang="en-US" dirty="0" smtClean="0"/>
+            </a:p>
+            <a:p>
+              <a:pPr algn="ctr"/>
+              <a:endParaRPr lang="en-US" dirty="0"/>
+            </a:p>
+            <a:p>
+              <a:pPr algn="ctr"/>
+              <a:endParaRPr lang="en-US" dirty="0"/>
+            </a:p>
+          </p:txBody>
+        </p:sp>
+        <p:sp>
+          <p:nvSpPr>
+            <p:cNvPr id="11" name="Rounded Rectangle 10"/>
+            <p:cNvSpPr/>
+            <p:nvPr/>
+          </p:nvSpPr>
+          <p:spPr>
+            <a:xfrm>
+              <a:off x="6791964" y="1143900"/>
+              <a:ext cx="2689411" cy="527124"/>
+            </a:xfrm>
+            <a:prstGeom prst="roundRect">
+              <a:avLst/>
+            </a:prstGeom>
+          </p:spPr>
+          <p:style>
+            <a:lnRef idx="0">
+              <a:schemeClr val="accent5"/>
+            </a:lnRef>
+            <a:fillRef idx="3">
+              <a:schemeClr val="accent5"/>
+            </a:fillRef>
+            <a:effectRef idx="3">
+              <a:schemeClr val="accent5"/>
+            </a:effectRef>
+            <a:fontRef idx="minor">
+              <a:schemeClr val="lt1"/>
+            </a:fontRef>
+          </p:style>
+          <p:txBody>
+            <a:bodyPr rtlCol="0" anchor="ctr"/>
+            <a:lstStyle/>
+            <a:p>
+              <a:pPr algn="ctr"/>
+              <a:r>
+                <a:rPr lang="en-US" dirty="0" smtClean="0"/>
+                <a:t>Title</a:t>
+              </a:r>
+              <a:endParaRPr lang="en-US" dirty="0"/>
+            </a:p>
+          </p:txBody>
+        </p:sp>
+        <p:sp>
+          <p:nvSpPr>
+            <p:cNvPr id="12" name="Rounded Rectangle 11"/>
+            <p:cNvSpPr/>
+            <p:nvPr/>
+          </p:nvSpPr>
+          <p:spPr>
+            <a:xfrm>
+              <a:off x="6791963" y="2482329"/>
+              <a:ext cx="2689411" cy="527124"/>
+            </a:xfrm>
+            <a:prstGeom prst="roundRect">
+              <a:avLst/>
+            </a:prstGeom>
+          </p:spPr>
+          <p:style>
+            <a:lnRef idx="0">
+              <a:schemeClr val="accent5"/>
+            </a:lnRef>
+            <a:fillRef idx="3">
+              <a:schemeClr val="accent5"/>
+            </a:fillRef>
+            <a:effectRef idx="3">
+              <a:schemeClr val="accent5"/>
+            </a:effectRef>
+            <a:fontRef idx="minor">
+              <a:schemeClr val="lt1"/>
+            </a:fontRef>
+          </p:style>
+          <p:txBody>
+            <a:bodyPr rtlCol="0" anchor="ctr"/>
+            <a:lstStyle/>
+            <a:p>
+              <a:pPr algn="ctr"/>
+              <a:r>
+                <a:rPr lang="en-US" dirty="0" smtClean="0"/>
+                <a:t>Developer</a:t>
+              </a:r>
+              <a:endParaRPr lang="en-US" dirty="0"/>
+            </a:p>
+          </p:txBody>
+        </p:sp>
+        <p:sp>
+          <p:nvSpPr>
+            <p:cNvPr id="13" name="Rounded Rectangle 12"/>
+            <p:cNvSpPr/>
+            <p:nvPr/>
+          </p:nvSpPr>
+          <p:spPr>
+            <a:xfrm>
+              <a:off x="6791963" y="1813114"/>
+              <a:ext cx="2689411" cy="527124"/>
+            </a:xfrm>
+            <a:prstGeom prst="roundRect">
+              <a:avLst/>
+            </a:prstGeom>
+          </p:spPr>
+          <p:style>
+            <a:lnRef idx="0">
+              <a:schemeClr val="accent5"/>
+            </a:lnRef>
+            <a:fillRef idx="3">
+              <a:schemeClr val="accent5"/>
+            </a:fillRef>
+            <a:effectRef idx="3">
+              <a:schemeClr val="accent5"/>
+            </a:effectRef>
+            <a:fontRef idx="minor">
+              <a:schemeClr val="lt1"/>
+            </a:fontRef>
+          </p:style>
+          <p:txBody>
+            <a:bodyPr rtlCol="0" anchor="ctr"/>
+            <a:lstStyle/>
+            <a:p>
+              <a:pPr algn="ctr"/>
+              <a:r>
+                <a:rPr lang="en-US" dirty="0" smtClean="0"/>
+                <a:t>Description</a:t>
+              </a:r>
+              <a:endParaRPr lang="en-US" dirty="0"/>
+            </a:p>
+          </p:txBody>
+        </p:sp>
+        <p:sp>
+          <p:nvSpPr>
+            <p:cNvPr id="14" name="Rounded Rectangle 13"/>
+            <p:cNvSpPr/>
+            <p:nvPr/>
+          </p:nvSpPr>
+          <p:spPr>
+            <a:xfrm>
+              <a:off x="6791962" y="3147958"/>
+              <a:ext cx="2689411" cy="527124"/>
+            </a:xfrm>
+            <a:prstGeom prst="roundRect">
+              <a:avLst/>
+            </a:prstGeom>
+          </p:spPr>
+          <p:style>
+            <a:lnRef idx="0">
+              <a:schemeClr val="accent5"/>
+            </a:lnRef>
+            <a:fillRef idx="3">
+              <a:schemeClr val="accent5"/>
+            </a:fillRef>
+            <a:effectRef idx="3">
+              <a:schemeClr val="accent5"/>
+            </a:effectRef>
+            <a:fontRef idx="minor">
+              <a:schemeClr val="lt1"/>
+            </a:fontRef>
+          </p:style>
+          <p:txBody>
+            <a:bodyPr rtlCol="0" anchor="ctr"/>
+            <a:lstStyle/>
+            <a:p>
+              <a:pPr algn="ctr"/>
+              <a:r>
+                <a:rPr lang="en-US" dirty="0" smtClean="0"/>
+                <a:t>Load() / Save()</a:t>
+              </a:r>
+              <a:endParaRPr lang="en-US" dirty="0"/>
+            </a:p>
+          </p:txBody>
+        </p:sp>
+      </p:grpSp>
+      <p:grpSp>
+        <p:nvGrpSpPr>
+          <p:cNvPr id="37" name="Group 36"/>
+          <p:cNvGrpSpPr/>
           <p:nvPr/>
-        </p:nvSpPr>
-        <p:spPr>
+        </p:nvGrpSpPr>
+        <p:grpSpPr>
           <a:xfrm>
-            <a:off x="8901361" y="2230422"/>
-            <a:ext cx="2689411" cy="527124"/>
+            <a:off x="8512884" y="45068"/>
+            <a:ext cx="3391061" cy="3341266"/>
+            <a:chOff x="9545921" y="2790356"/>
+            <a:chExt cx="3679115" cy="3475533"/>
           </a:xfrm>
-          <a:prstGeom prst="roundRect">
-            <a:avLst/>
-          </a:prstGeom>
-        </p:spPr>
-        <p:style>
-          <a:lnRef idx="0">
-            <a:schemeClr val="accent5"/>
-          </a:lnRef>
-          <a:fillRef idx="3">
-            <a:schemeClr val="accent5"/>
-          </a:fillRef>
-          <a:effectRef idx="3">
-            <a:schemeClr val="accent5"/>
-          </a:effectRef>
-          <a:fontRef idx="minor">
-            <a:schemeClr val="lt1"/>
-          </a:fontRef>
-        </p:style>
-        <p:txBody>
-          <a:bodyPr rtlCol="0" anchor="ctr"/>
-          <a:lstStyle/>
-          <a:p>
-            <a:pPr algn="ctr"/>
-            <a:r>
-              <a:rPr lang="en-US" dirty="0" err="1" smtClean="0"/>
-              <a:t>FirstName</a:t>
-            </a:r>
-            <a:endParaRPr lang="en-US" dirty="0"/>
-          </a:p>
-        </p:txBody>
-      </p:sp>
-      <p:sp>
-        <p:nvSpPr>
-          <p:cNvPr id="12" name="Rounded Rectangle 11"/>
-          <p:cNvSpPr/>
-          <p:nvPr/>
-        </p:nvSpPr>
-        <p:spPr>
-          <a:xfrm>
-            <a:off x="8901360" y="3568851"/>
-            <a:ext cx="2689411" cy="527124"/>
-          </a:xfrm>
-          <a:prstGeom prst="roundRect">
-            <a:avLst/>
-          </a:prstGeom>
-        </p:spPr>
-        <p:style>
-          <a:lnRef idx="0">
-            <a:schemeClr val="accent5"/>
-          </a:lnRef>
-          <a:fillRef idx="3">
-            <a:schemeClr val="accent5"/>
-          </a:fillRef>
-          <a:effectRef idx="3">
-            <a:schemeClr val="accent5"/>
-          </a:effectRef>
-          <a:fontRef idx="minor">
-            <a:schemeClr val="lt1"/>
-          </a:fontRef>
-        </p:style>
-        <p:txBody>
-          <a:bodyPr rtlCol="0" anchor="ctr"/>
-          <a:lstStyle/>
-          <a:p>
-            <a:pPr algn="ctr"/>
-            <a:r>
-              <a:rPr lang="en-US" dirty="0" smtClean="0"/>
-              <a:t>Email</a:t>
-            </a:r>
-            <a:endParaRPr lang="en-US" dirty="0"/>
-          </a:p>
-        </p:txBody>
-      </p:sp>
-      <p:sp>
-        <p:nvSpPr>
-          <p:cNvPr id="13" name="Rounded Rectangle 12"/>
-          <p:cNvSpPr/>
-          <p:nvPr/>
-        </p:nvSpPr>
-        <p:spPr>
-          <a:xfrm>
-            <a:off x="8901360" y="2899636"/>
-            <a:ext cx="2689411" cy="527124"/>
-          </a:xfrm>
-          <a:prstGeom prst="roundRect">
-            <a:avLst/>
-          </a:prstGeom>
-        </p:spPr>
-        <p:style>
-          <a:lnRef idx="0">
-            <a:schemeClr val="accent5"/>
-          </a:lnRef>
-          <a:fillRef idx="3">
-            <a:schemeClr val="accent5"/>
-          </a:fillRef>
-          <a:effectRef idx="3">
-            <a:schemeClr val="accent5"/>
-          </a:effectRef>
-          <a:fontRef idx="minor">
-            <a:schemeClr val="lt1"/>
-          </a:fontRef>
-        </p:style>
-        <p:txBody>
-          <a:bodyPr rtlCol="0" anchor="ctr"/>
-          <a:lstStyle/>
-          <a:p>
-            <a:pPr algn="ctr"/>
-            <a:r>
-              <a:rPr lang="en-US" dirty="0" err="1" smtClean="0"/>
-              <a:t>LastName</a:t>
-            </a:r>
-            <a:endParaRPr lang="en-US" dirty="0"/>
-          </a:p>
-        </p:txBody>
-      </p:sp>
-      <p:sp>
-        <p:nvSpPr>
-          <p:cNvPr id="14" name="Rounded Rectangle 13"/>
-          <p:cNvSpPr/>
-          <p:nvPr/>
-        </p:nvSpPr>
-        <p:spPr>
-          <a:xfrm>
-            <a:off x="8901359" y="4234480"/>
-            <a:ext cx="2689411" cy="527124"/>
-          </a:xfrm>
-          <a:prstGeom prst="roundRect">
-            <a:avLst/>
-          </a:prstGeom>
-        </p:spPr>
-        <p:style>
-          <a:lnRef idx="0">
-            <a:schemeClr val="accent5"/>
-          </a:lnRef>
-          <a:fillRef idx="3">
-            <a:schemeClr val="accent5"/>
-          </a:fillRef>
-          <a:effectRef idx="3">
-            <a:schemeClr val="accent5"/>
-          </a:effectRef>
-          <a:fontRef idx="minor">
-            <a:schemeClr val="lt1"/>
-          </a:fontRef>
-        </p:style>
-        <p:txBody>
-          <a:bodyPr rtlCol="0" anchor="ctr"/>
-          <a:lstStyle/>
-          <a:p>
-            <a:pPr algn="ctr"/>
-            <a:r>
-              <a:rPr lang="en-US" dirty="0" err="1" smtClean="0"/>
-              <a:t>LoadUser</a:t>
-            </a:r>
-            <a:r>
-              <a:rPr lang="en-US" dirty="0" smtClean="0"/>
-              <a:t>()</a:t>
-            </a:r>
-            <a:endParaRPr lang="en-US" dirty="0"/>
-          </a:p>
-        </p:txBody>
-      </p:sp>
-      <p:sp>
-        <p:nvSpPr>
-          <p:cNvPr id="15" name="Rounded Rectangle 14"/>
-          <p:cNvSpPr/>
-          <p:nvPr/>
-        </p:nvSpPr>
-        <p:spPr>
-          <a:xfrm>
-            <a:off x="8901359" y="4900109"/>
-            <a:ext cx="2689411" cy="527124"/>
-          </a:xfrm>
-          <a:prstGeom prst="roundRect">
-            <a:avLst/>
-          </a:prstGeom>
-        </p:spPr>
-        <p:style>
-          <a:lnRef idx="0">
-            <a:schemeClr val="accent5"/>
-          </a:lnRef>
-          <a:fillRef idx="3">
-            <a:schemeClr val="accent5"/>
-          </a:fillRef>
-          <a:effectRef idx="3">
-            <a:schemeClr val="accent5"/>
-          </a:effectRef>
-          <a:fontRef idx="minor">
-            <a:schemeClr val="lt1"/>
-          </a:fontRef>
-        </p:style>
-        <p:txBody>
-          <a:bodyPr rtlCol="0" anchor="ctr"/>
-          <a:lstStyle/>
-          <a:p>
-            <a:pPr algn="ctr"/>
-            <a:r>
-              <a:rPr lang="en-US" dirty="0" err="1" smtClean="0"/>
-              <a:t>SaveUser</a:t>
-            </a:r>
-            <a:r>
-              <a:rPr lang="en-US" dirty="0" smtClean="0"/>
-              <a:t>()</a:t>
-            </a:r>
-            <a:endParaRPr lang="en-US" dirty="0"/>
-          </a:p>
-        </p:txBody>
-      </p:sp>
+        </p:grpSpPr>
+        <p:sp>
+          <p:nvSpPr>
+            <p:cNvPr id="31" name="Rounded Rectangle 30"/>
+            <p:cNvSpPr/>
+            <p:nvPr/>
+          </p:nvSpPr>
+          <p:spPr>
+            <a:xfrm>
+              <a:off x="9545921" y="2790356"/>
+              <a:ext cx="3679115" cy="3475533"/>
+            </a:xfrm>
+            <a:prstGeom prst="roundRect">
+              <a:avLst>
+                <a:gd name="adj" fmla="val 11262"/>
+              </a:avLst>
+            </a:prstGeom>
+          </p:spPr>
+          <p:style>
+            <a:lnRef idx="1">
+              <a:schemeClr val="accent5"/>
+            </a:lnRef>
+            <a:fillRef idx="2">
+              <a:schemeClr val="accent5"/>
+            </a:fillRef>
+            <a:effectRef idx="1">
+              <a:schemeClr val="accent5"/>
+            </a:effectRef>
+            <a:fontRef idx="minor">
+              <a:schemeClr val="dk1"/>
+            </a:fontRef>
+          </p:style>
+          <p:txBody>
+            <a:bodyPr rtlCol="0" anchor="ctr"/>
+            <a:lstStyle/>
+            <a:p>
+              <a:pPr algn="ctr"/>
+              <a:r>
+                <a:rPr lang="en-US" b="1" dirty="0" smtClean="0"/>
+                <a:t>Person Model</a:t>
+              </a:r>
+            </a:p>
+            <a:p>
+              <a:pPr algn="ctr"/>
+              <a:endParaRPr lang="en-US" b="1" dirty="0" smtClean="0"/>
+            </a:p>
+            <a:p>
+              <a:pPr algn="ctr"/>
+              <a:endParaRPr lang="en-US" b="1" dirty="0"/>
+            </a:p>
+            <a:p>
+              <a:pPr algn="ctr"/>
+              <a:endParaRPr lang="en-US" b="1" dirty="0" smtClean="0"/>
+            </a:p>
+            <a:p>
+              <a:pPr algn="ctr"/>
+              <a:endParaRPr lang="en-US" b="1" dirty="0"/>
+            </a:p>
+            <a:p>
+              <a:pPr algn="ctr"/>
+              <a:endParaRPr lang="en-US" b="1" dirty="0" smtClean="0"/>
+            </a:p>
+            <a:p>
+              <a:pPr algn="ctr"/>
+              <a:endParaRPr lang="en-US" dirty="0"/>
+            </a:p>
+            <a:p>
+              <a:pPr algn="ctr"/>
+              <a:endParaRPr lang="en-US" dirty="0" smtClean="0"/>
+            </a:p>
+            <a:p>
+              <a:pPr algn="ctr"/>
+              <a:endParaRPr lang="en-US" dirty="0"/>
+            </a:p>
+            <a:p>
+              <a:pPr algn="ctr"/>
+              <a:endParaRPr lang="en-US" dirty="0" smtClean="0"/>
+            </a:p>
+            <a:p>
+              <a:pPr algn="ctr"/>
+              <a:endParaRPr lang="en-US" dirty="0"/>
+            </a:p>
+            <a:p>
+              <a:pPr algn="ctr"/>
+              <a:endParaRPr lang="en-US" dirty="0"/>
+            </a:p>
+          </p:txBody>
+        </p:sp>
+        <p:sp>
+          <p:nvSpPr>
+            <p:cNvPr id="32" name="Rounded Rectangle 31"/>
+            <p:cNvSpPr/>
+            <p:nvPr/>
+          </p:nvSpPr>
+          <p:spPr>
+            <a:xfrm>
+              <a:off x="10040772" y="3373064"/>
+              <a:ext cx="2689411" cy="527124"/>
+            </a:xfrm>
+            <a:prstGeom prst="roundRect">
+              <a:avLst/>
+            </a:prstGeom>
+          </p:spPr>
+          <p:style>
+            <a:lnRef idx="0">
+              <a:schemeClr val="accent5"/>
+            </a:lnRef>
+            <a:fillRef idx="3">
+              <a:schemeClr val="accent5"/>
+            </a:fillRef>
+            <a:effectRef idx="3">
+              <a:schemeClr val="accent5"/>
+            </a:effectRef>
+            <a:fontRef idx="minor">
+              <a:schemeClr val="lt1"/>
+            </a:fontRef>
+          </p:style>
+          <p:txBody>
+            <a:bodyPr rtlCol="0" anchor="ctr"/>
+            <a:lstStyle/>
+            <a:p>
+              <a:pPr algn="ctr"/>
+              <a:r>
+                <a:rPr lang="en-US" dirty="0" err="1" smtClean="0"/>
+                <a:t>FirstName</a:t>
+              </a:r>
+              <a:endParaRPr lang="en-US" dirty="0"/>
+            </a:p>
+          </p:txBody>
+        </p:sp>
+        <p:sp>
+          <p:nvSpPr>
+            <p:cNvPr id="33" name="Rounded Rectangle 32"/>
+            <p:cNvSpPr/>
+            <p:nvPr/>
+          </p:nvSpPr>
+          <p:spPr>
+            <a:xfrm>
+              <a:off x="10040771" y="4711493"/>
+              <a:ext cx="2689411" cy="527124"/>
+            </a:xfrm>
+            <a:prstGeom prst="roundRect">
+              <a:avLst/>
+            </a:prstGeom>
+          </p:spPr>
+          <p:style>
+            <a:lnRef idx="0">
+              <a:schemeClr val="accent5"/>
+            </a:lnRef>
+            <a:fillRef idx="3">
+              <a:schemeClr val="accent5"/>
+            </a:fillRef>
+            <a:effectRef idx="3">
+              <a:schemeClr val="accent5"/>
+            </a:effectRef>
+            <a:fontRef idx="minor">
+              <a:schemeClr val="lt1"/>
+            </a:fontRef>
+          </p:style>
+          <p:txBody>
+            <a:bodyPr rtlCol="0" anchor="ctr"/>
+            <a:lstStyle/>
+            <a:p>
+              <a:pPr algn="ctr"/>
+              <a:r>
+                <a:rPr lang="en-US" dirty="0" smtClean="0"/>
+                <a:t>Email</a:t>
+              </a:r>
+              <a:endParaRPr lang="en-US" dirty="0"/>
+            </a:p>
+          </p:txBody>
+        </p:sp>
+        <p:sp>
+          <p:nvSpPr>
+            <p:cNvPr id="34" name="Rounded Rectangle 33"/>
+            <p:cNvSpPr/>
+            <p:nvPr/>
+          </p:nvSpPr>
+          <p:spPr>
+            <a:xfrm>
+              <a:off x="10040771" y="4042278"/>
+              <a:ext cx="2689411" cy="527124"/>
+            </a:xfrm>
+            <a:prstGeom prst="roundRect">
+              <a:avLst/>
+            </a:prstGeom>
+          </p:spPr>
+          <p:style>
+            <a:lnRef idx="0">
+              <a:schemeClr val="accent5"/>
+            </a:lnRef>
+            <a:fillRef idx="3">
+              <a:schemeClr val="accent5"/>
+            </a:fillRef>
+            <a:effectRef idx="3">
+              <a:schemeClr val="accent5"/>
+            </a:effectRef>
+            <a:fontRef idx="minor">
+              <a:schemeClr val="lt1"/>
+            </a:fontRef>
+          </p:style>
+          <p:txBody>
+            <a:bodyPr rtlCol="0" anchor="ctr"/>
+            <a:lstStyle/>
+            <a:p>
+              <a:pPr algn="ctr"/>
+              <a:r>
+                <a:rPr lang="en-US" dirty="0" err="1" smtClean="0"/>
+                <a:t>LastName</a:t>
+              </a:r>
+              <a:endParaRPr lang="en-US" dirty="0"/>
+            </a:p>
+          </p:txBody>
+        </p:sp>
+        <p:sp>
+          <p:nvSpPr>
+            <p:cNvPr id="35" name="Rounded Rectangle 34"/>
+            <p:cNvSpPr/>
+            <p:nvPr/>
+          </p:nvSpPr>
+          <p:spPr>
+            <a:xfrm>
+              <a:off x="10040770" y="5377122"/>
+              <a:ext cx="2689411" cy="527124"/>
+            </a:xfrm>
+            <a:prstGeom prst="roundRect">
+              <a:avLst/>
+            </a:prstGeom>
+          </p:spPr>
+          <p:style>
+            <a:lnRef idx="0">
+              <a:schemeClr val="accent5"/>
+            </a:lnRef>
+            <a:fillRef idx="3">
+              <a:schemeClr val="accent5"/>
+            </a:fillRef>
+            <a:effectRef idx="3">
+              <a:schemeClr val="accent5"/>
+            </a:effectRef>
+            <a:fontRef idx="minor">
+              <a:schemeClr val="lt1"/>
+            </a:fontRef>
+          </p:style>
+          <p:txBody>
+            <a:bodyPr rtlCol="0" anchor="ctr"/>
+            <a:lstStyle/>
+            <a:p>
+              <a:pPr algn="ctr"/>
+              <a:r>
+                <a:rPr lang="en-US" dirty="0" smtClean="0"/>
+                <a:t>Load() / Save()</a:t>
+              </a:r>
+              <a:endParaRPr lang="en-US" dirty="0"/>
+            </a:p>
+          </p:txBody>
+        </p:sp>
+      </p:grpSp>
     </p:spTree>
     <p:extLst>
       <p:ext uri="{BB962C8B-B14F-4D97-AF65-F5344CB8AC3E}">
-        <p14:creationId xmlns:p14="http://schemas.microsoft.com/office/powerpoint/2010/main" val="17314703"/>
+        <p14:creationId xmlns:p14="http://schemas.microsoft.com/office/powerpoint/2010/main" val="2456147679"/>
       </p:ext>
     </p:extLst>
   </p:cSld>
@@ -6402,7 +7270,7 @@
             <p:ph sz="quarter" idx="10"/>
             <p:extLst>
               <p:ext uri="{D42A27DB-BD31-4B8C-83A1-F6EECF244321}">
-                <p14:modId xmlns:p14="http://schemas.microsoft.com/office/powerpoint/2010/main" val="1190803272"/>
+                <p14:modId xmlns:p14="http://schemas.microsoft.com/office/powerpoint/2010/main" val="1978256986"/>
               </p:ext>
             </p:extLst>
           </p:nvPr>
@@ -6562,7 +7430,7 @@
                           <a:latin typeface="Segoe UI Light" panose="020B0502040204020203" pitchFamily="34" charset="0"/>
                           <a:cs typeface="Segoe UI Light" panose="020B0502040204020203" pitchFamily="34" charset="0"/>
                         </a:rPr>
-                        <a:t>05 | Bringing It All Together</a:t>
+                        <a:t>05 | Single Page Applications</a:t>
                       </a:r>
                       <a:endParaRPr lang="en-US" sz="2400" dirty="0">
                         <a:latin typeface="Segoe UI Light" panose="020B0502040204020203" pitchFamily="34" charset="0"/>
@@ -6613,7 +7481,7 @@
                           <a:latin typeface="Segoe UI Light" panose="020B0502040204020203" pitchFamily="34" charset="0"/>
                           <a:cs typeface="Segoe UI Light" panose="020B0502040204020203" pitchFamily="34" charset="0"/>
                         </a:rPr>
-                        <a:t> | Loops, Logic and Templates</a:t>
+                        <a:t> | Components</a:t>
                       </a:r>
                       <a:endParaRPr lang="en-US" sz="2400" dirty="0" smtClean="0">
                         <a:latin typeface="Segoe UI Light" panose="020B0502040204020203" pitchFamily="34" charset="0"/>
@@ -7142,7 +8010,7 @@
 </file>
 
 <file path=ppt/slides/slide9.xml><?xml version="1.0" encoding="utf-8"?>
-<p:sld xmlns:a="http://schemas.openxmlformats.org/drawingml/2006/main" xmlns:r="http://schemas.openxmlformats.org/officeDocument/2006/relationships" xmlns:p="http://schemas.openxmlformats.org/presentationml/2006/main" show="0">
+<p:sld xmlns:a="http://schemas.openxmlformats.org/drawingml/2006/main" xmlns:r="http://schemas.openxmlformats.org/officeDocument/2006/relationships" xmlns:p="http://schemas.openxmlformats.org/presentationml/2006/main">
   <p:cSld>
     <p:spTree>
       <p:nvGrpSpPr>
@@ -7160,7 +8028,7 @@
       </p:grpSpPr>
       <p:sp>
         <p:nvSpPr>
-          <p:cNvPr id="2" name="Title 1"/>
+          <p:cNvPr id="5" name="Title 4"/>
           <p:cNvSpPr>
             <a:spLocks noGrp="1"/>
           </p:cNvSpPr>
@@ -7175,545 +8043,28 @@
           <a:p>
             <a:r>
               <a:rPr lang="en-CA" dirty="0" smtClean="0"/>
-              <a:t>What is Knockout?</a:t>
-            </a:r>
-            <a:endParaRPr lang="en-US" dirty="0"/>
-          </a:p>
-        </p:txBody>
-      </p:sp>
-      <p:sp>
-        <p:nvSpPr>
-          <p:cNvPr id="3" name="Content Placeholder 2"/>
-          <p:cNvSpPr>
-            <a:spLocks noGrp="1"/>
-          </p:cNvSpPr>
-          <p:nvPr>
-            <p:ph sz="quarter" idx="10"/>
-          </p:nvPr>
-        </p:nvSpPr>
-        <p:spPr/>
-        <p:txBody>
-          <a:bodyPr/>
-          <a:lstStyle/>
-          <a:p>
-            <a:r>
-              <a:rPr lang="en-CA" dirty="0" smtClean="0"/>
-              <a:t>A JavaScript Library (not framework)</a:t>
-            </a:r>
-          </a:p>
-          <a:p>
-            <a:r>
-              <a:rPr lang="en-CA" dirty="0" smtClean="0"/>
-              <a:t>Made to simplify dynamic JavaScript </a:t>
-            </a:r>
-            <a:r>
-              <a:rPr lang="en-CA" dirty="0" err="1" smtClean="0"/>
-              <a:t>Uis</a:t>
-            </a:r>
-            <a:r>
-              <a:rPr lang="en-CA" dirty="0" smtClean="0"/>
-              <a:t> with the Model-View-</a:t>
-            </a:r>
-            <a:r>
-              <a:rPr lang="en-CA" dirty="0" err="1" smtClean="0"/>
-              <a:t>ViewModel</a:t>
-            </a:r>
-            <a:r>
-              <a:rPr lang="en-CA" dirty="0" smtClean="0"/>
-              <a:t> </a:t>
-            </a:r>
-            <a:r>
-              <a:rPr lang="en-CA" dirty="0" err="1" smtClean="0"/>
-              <a:t>Patern</a:t>
-            </a:r>
-            <a:endParaRPr lang="en-CA" dirty="0" smtClean="0"/>
-          </a:p>
-          <a:p>
-            <a:r>
-              <a:rPr lang="en-CA" dirty="0" smtClean="0"/>
-              <a:t>Key concepts</a:t>
-            </a:r>
-          </a:p>
-          <a:p>
-            <a:pPr lvl="1"/>
-            <a:r>
-              <a:rPr lang="en-CA" dirty="0" smtClean="0"/>
-              <a:t>Declarative Bindings</a:t>
-            </a:r>
-          </a:p>
-          <a:p>
-            <a:pPr lvl="1"/>
-            <a:r>
-              <a:rPr lang="en-CA" dirty="0" smtClean="0"/>
-              <a:t>Automatic UI Refresh</a:t>
-            </a:r>
-          </a:p>
-          <a:p>
-            <a:pPr lvl="1"/>
-            <a:r>
-              <a:rPr lang="en-CA" dirty="0" smtClean="0"/>
-              <a:t>Dependency Tracking</a:t>
-            </a:r>
-          </a:p>
-          <a:p>
-            <a:pPr lvl="1"/>
-            <a:r>
-              <a:rPr lang="en-CA" dirty="0" smtClean="0"/>
-              <a:t>Templating</a:t>
-            </a:r>
-          </a:p>
-        </p:txBody>
-      </p:sp>
-      <p:pic>
-        <p:nvPicPr>
-          <p:cNvPr id="7" name="Picture 6" descr="Screen Clipping"/>
-          <p:cNvPicPr>
-            <a:picLocks noChangeAspect="1"/>
-          </p:cNvPicPr>
-          <p:nvPr/>
-        </p:nvPicPr>
-        <p:blipFill>
-          <a:blip r:embed="rId3">
-            <a:extLst>
-              <a:ext uri="{28A0092B-C50C-407E-A947-70E740481C1C}">
-                <a14:useLocalDpi xmlns:a14="http://schemas.microsoft.com/office/drawing/2010/main" val="0"/>
-              </a:ext>
-            </a:extLst>
-          </a:blip>
-          <a:stretch>
-            <a:fillRect/>
-          </a:stretch>
-        </p:blipFill>
-        <p:spPr>
-          <a:xfrm>
-            <a:off x="-609600" y="0"/>
-            <a:ext cx="13577982" cy="7721600"/>
-          </a:xfrm>
-          <a:prstGeom prst="rect">
-            <a:avLst/>
-          </a:prstGeom>
-        </p:spPr>
-      </p:pic>
+              <a:t>What we’ll be building</a:t>
+            </a:r>
+            <a:endParaRPr lang="en-US" dirty="0"/>
+          </a:p>
+        </p:txBody>
+      </p:sp>
     </p:spTree>
     <p:extLst>
       <p:ext uri="{BB962C8B-B14F-4D97-AF65-F5344CB8AC3E}">
-        <p14:creationId xmlns:p14="http://schemas.microsoft.com/office/powerpoint/2010/main" val="1269858289"/>
+        <p14:creationId xmlns:p14="http://schemas.microsoft.com/office/powerpoint/2010/main" val="757686776"/>
       </p:ext>
     </p:extLst>
   </p:cSld>
   <p:clrMapOvr>
     <a:masterClrMapping/>
   </p:clrMapOvr>
-  <mc:AlternateContent xmlns:mc="http://schemas.openxmlformats.org/markup-compatibility/2006">
-    <mc:Choice xmlns:p14="http://schemas.microsoft.com/office/powerpoint/2010/main" Requires="p14">
-      <p:transition spd="slow" p14:dur="2000"/>
-    </mc:Choice>
-    <mc:Fallback>
-      <p:transition spd="slow"/>
-    </mc:Fallback>
-  </mc:AlternateContent>
   <p:timing>
     <p:tnLst>
       <p:par>
-        <p:cTn id="1" dur="indefinite" restart="never" nodeType="tmRoot">
-          <p:childTnLst>
-            <p:seq concurrent="1" nextAc="seek">
-              <p:cTn id="2" dur="indefinite" nodeType="mainSeq">
-                <p:childTnLst>
-                  <p:par>
-                    <p:cTn id="3" fill="hold">
-                      <p:stCondLst>
-                        <p:cond delay="indefinite"/>
-                      </p:stCondLst>
-                      <p:childTnLst>
-                        <p:par>
-                          <p:cTn id="4" fill="hold">
-                            <p:stCondLst>
-                              <p:cond delay="0"/>
-                            </p:stCondLst>
-                            <p:childTnLst>
-                              <p:par>
-                                <p:cTn id="5" presetID="1" presetClass="entr" presetSubtype="0" fill="hold" grpId="0" nodeType="clickEffect">
-                                  <p:stCondLst>
-                                    <p:cond delay="0"/>
-                                  </p:stCondLst>
-                                  <p:childTnLst>
-                                    <p:set>
-                                      <p:cBhvr>
-                                        <p:cTn id="6" dur="1" fill="hold">
-                                          <p:stCondLst>
-                                            <p:cond delay="0"/>
-                                          </p:stCondLst>
-                                        </p:cTn>
-                                        <p:tgtEl>
-                                          <p:spTgt spid="3">
-                                            <p:txEl>
-                                              <p:pRg st="0" end="0"/>
-                                            </p:txEl>
-                                          </p:spTgt>
-                                        </p:tgtEl>
-                                        <p:attrNameLst>
-                                          <p:attrName>style.visibility</p:attrName>
-                                        </p:attrNameLst>
-                                      </p:cBhvr>
-                                      <p:to>
-                                        <p:strVal val="visible"/>
-                                      </p:to>
-                                    </p:set>
-                                  </p:childTnLst>
-                                </p:cTn>
-                              </p:par>
-                            </p:childTnLst>
-                          </p:cTn>
-                        </p:par>
-                      </p:childTnLst>
-                    </p:cTn>
-                  </p:par>
-                  <p:par>
-                    <p:cTn id="7" fill="hold">
-                      <p:stCondLst>
-                        <p:cond delay="indefinite"/>
-                      </p:stCondLst>
-                      <p:childTnLst>
-                        <p:par>
-                          <p:cTn id="8" fill="hold">
-                            <p:stCondLst>
-                              <p:cond delay="0"/>
-                            </p:stCondLst>
-                            <p:childTnLst>
-                              <p:par>
-                                <p:cTn id="9" presetID="1" presetClass="entr" presetSubtype="0" fill="hold" grpId="0" nodeType="clickEffect">
-                                  <p:stCondLst>
-                                    <p:cond delay="0"/>
-                                  </p:stCondLst>
-                                  <p:childTnLst>
-                                    <p:set>
-                                      <p:cBhvr>
-                                        <p:cTn id="10" dur="1" fill="hold">
-                                          <p:stCondLst>
-                                            <p:cond delay="0"/>
-                                          </p:stCondLst>
-                                        </p:cTn>
-                                        <p:tgtEl>
-                                          <p:spTgt spid="3">
-                                            <p:txEl>
-                                              <p:pRg st="1" end="1"/>
-                                            </p:txEl>
-                                          </p:spTgt>
-                                        </p:tgtEl>
-                                        <p:attrNameLst>
-                                          <p:attrName>style.visibility</p:attrName>
-                                        </p:attrNameLst>
-                                      </p:cBhvr>
-                                      <p:to>
-                                        <p:strVal val="visible"/>
-                                      </p:to>
-                                    </p:set>
-                                  </p:childTnLst>
-                                </p:cTn>
-                              </p:par>
-                            </p:childTnLst>
-                          </p:cTn>
-                        </p:par>
-                      </p:childTnLst>
-                    </p:cTn>
-                  </p:par>
-                  <p:par>
-                    <p:cTn id="11" fill="hold">
-                      <p:stCondLst>
-                        <p:cond delay="indefinite"/>
-                      </p:stCondLst>
-                      <p:childTnLst>
-                        <p:par>
-                          <p:cTn id="12" fill="hold">
-                            <p:stCondLst>
-                              <p:cond delay="0"/>
-                            </p:stCondLst>
-                            <p:childTnLst>
-                              <p:par>
-                                <p:cTn id="13" presetID="1" presetClass="entr" presetSubtype="0" fill="hold" grpId="0" nodeType="clickEffect">
-                                  <p:stCondLst>
-                                    <p:cond delay="0"/>
-                                  </p:stCondLst>
-                                  <p:childTnLst>
-                                    <p:set>
-                                      <p:cBhvr>
-                                        <p:cTn id="14" dur="1" fill="hold">
-                                          <p:stCondLst>
-                                            <p:cond delay="0"/>
-                                          </p:stCondLst>
-                                        </p:cTn>
-                                        <p:tgtEl>
-                                          <p:spTgt spid="3">
-                                            <p:txEl>
-                                              <p:pRg st="2" end="2"/>
-                                            </p:txEl>
-                                          </p:spTgt>
-                                        </p:tgtEl>
-                                        <p:attrNameLst>
-                                          <p:attrName>style.visibility</p:attrName>
-                                        </p:attrNameLst>
-                                      </p:cBhvr>
-                                      <p:to>
-                                        <p:strVal val="visible"/>
-                                      </p:to>
-                                    </p:set>
-                                  </p:childTnLst>
-                                </p:cTn>
-                              </p:par>
-                              <p:par>
-                                <p:cTn id="15" presetID="1" presetClass="entr" presetSubtype="0" fill="hold" grpId="0" nodeType="withEffect">
-                                  <p:stCondLst>
-                                    <p:cond delay="0"/>
-                                  </p:stCondLst>
-                                  <p:childTnLst>
-                                    <p:set>
-                                      <p:cBhvr>
-                                        <p:cTn id="16" dur="1" fill="hold">
-                                          <p:stCondLst>
-                                            <p:cond delay="0"/>
-                                          </p:stCondLst>
-                                        </p:cTn>
-                                        <p:tgtEl>
-                                          <p:spTgt spid="3">
-                                            <p:txEl>
-                                              <p:pRg st="3" end="3"/>
-                                            </p:txEl>
-                                          </p:spTgt>
-                                        </p:tgtEl>
-                                        <p:attrNameLst>
-                                          <p:attrName>style.visibility</p:attrName>
-                                        </p:attrNameLst>
-                                      </p:cBhvr>
-                                      <p:to>
-                                        <p:strVal val="visible"/>
-                                      </p:to>
-                                    </p:set>
-                                  </p:childTnLst>
-                                </p:cTn>
-                              </p:par>
-                              <p:par>
-                                <p:cTn id="17" presetID="1" presetClass="entr" presetSubtype="0" fill="hold" grpId="0" nodeType="withEffect">
-                                  <p:stCondLst>
-                                    <p:cond delay="0"/>
-                                  </p:stCondLst>
-                                  <p:childTnLst>
-                                    <p:set>
-                                      <p:cBhvr>
-                                        <p:cTn id="18" dur="1" fill="hold">
-                                          <p:stCondLst>
-                                            <p:cond delay="0"/>
-                                          </p:stCondLst>
-                                        </p:cTn>
-                                        <p:tgtEl>
-                                          <p:spTgt spid="3">
-                                            <p:txEl>
-                                              <p:pRg st="4" end="4"/>
-                                            </p:txEl>
-                                          </p:spTgt>
-                                        </p:tgtEl>
-                                        <p:attrNameLst>
-                                          <p:attrName>style.visibility</p:attrName>
-                                        </p:attrNameLst>
-                                      </p:cBhvr>
-                                      <p:to>
-                                        <p:strVal val="visible"/>
-                                      </p:to>
-                                    </p:set>
-                                  </p:childTnLst>
-                                </p:cTn>
-                              </p:par>
-                              <p:par>
-                                <p:cTn id="19" presetID="1" presetClass="entr" presetSubtype="0" fill="hold" grpId="0" nodeType="withEffect">
-                                  <p:stCondLst>
-                                    <p:cond delay="0"/>
-                                  </p:stCondLst>
-                                  <p:childTnLst>
-                                    <p:set>
-                                      <p:cBhvr>
-                                        <p:cTn id="20" dur="1" fill="hold">
-                                          <p:stCondLst>
-                                            <p:cond delay="0"/>
-                                          </p:stCondLst>
-                                        </p:cTn>
-                                        <p:tgtEl>
-                                          <p:spTgt spid="3">
-                                            <p:txEl>
-                                              <p:pRg st="5" end="5"/>
-                                            </p:txEl>
-                                          </p:spTgt>
-                                        </p:tgtEl>
-                                        <p:attrNameLst>
-                                          <p:attrName>style.visibility</p:attrName>
-                                        </p:attrNameLst>
-                                      </p:cBhvr>
-                                      <p:to>
-                                        <p:strVal val="visible"/>
-                                      </p:to>
-                                    </p:set>
-                                  </p:childTnLst>
-                                </p:cTn>
-                              </p:par>
-                              <p:par>
-                                <p:cTn id="21" presetID="1" presetClass="entr" presetSubtype="0" fill="hold" grpId="0" nodeType="withEffect">
-                                  <p:stCondLst>
-                                    <p:cond delay="0"/>
-                                  </p:stCondLst>
-                                  <p:childTnLst>
-                                    <p:set>
-                                      <p:cBhvr>
-                                        <p:cTn id="22" dur="1" fill="hold">
-                                          <p:stCondLst>
-                                            <p:cond delay="0"/>
-                                          </p:stCondLst>
-                                        </p:cTn>
-                                        <p:tgtEl>
-                                          <p:spTgt spid="3">
-                                            <p:txEl>
-                                              <p:pRg st="6" end="6"/>
-                                            </p:txEl>
-                                          </p:spTgt>
-                                        </p:tgtEl>
-                                        <p:attrNameLst>
-                                          <p:attrName>style.visibility</p:attrName>
-                                        </p:attrNameLst>
-                                      </p:cBhvr>
-                                      <p:to>
-                                        <p:strVal val="visible"/>
-                                      </p:to>
-                                    </p:set>
-                                  </p:childTnLst>
-                                </p:cTn>
-                              </p:par>
-                            </p:childTnLst>
-                          </p:cTn>
-                        </p:par>
-                      </p:childTnLst>
-                    </p:cTn>
-                  </p:par>
-                  <p:par>
-                    <p:cTn id="23" fill="hold">
-                      <p:stCondLst>
-                        <p:cond delay="indefinite"/>
-                      </p:stCondLst>
-                      <p:childTnLst>
-                        <p:par>
-                          <p:cTn id="24" fill="hold">
-                            <p:stCondLst>
-                              <p:cond delay="0"/>
-                            </p:stCondLst>
-                            <p:childTnLst>
-                              <p:par>
-                                <p:cTn id="25" presetID="42" presetClass="entr" presetSubtype="0" fill="hold" nodeType="clickEffect">
-                                  <p:stCondLst>
-                                    <p:cond delay="0"/>
-                                  </p:stCondLst>
-                                  <p:childTnLst>
-                                    <p:set>
-                                      <p:cBhvr>
-                                        <p:cTn id="26" dur="1" fill="hold">
-                                          <p:stCondLst>
-                                            <p:cond delay="0"/>
-                                          </p:stCondLst>
-                                        </p:cTn>
-                                        <p:tgtEl>
-                                          <p:spTgt spid="7"/>
-                                        </p:tgtEl>
-                                        <p:attrNameLst>
-                                          <p:attrName>style.visibility</p:attrName>
-                                        </p:attrNameLst>
-                                      </p:cBhvr>
-                                      <p:to>
-                                        <p:strVal val="visible"/>
-                                      </p:to>
-                                    </p:set>
-                                    <p:animEffect transition="in" filter="fade">
-                                      <p:cBhvr>
-                                        <p:cTn id="27" dur="1000"/>
-                                        <p:tgtEl>
-                                          <p:spTgt spid="7"/>
-                                        </p:tgtEl>
-                                      </p:cBhvr>
-                                    </p:animEffect>
-                                    <p:anim calcmode="lin" valueType="num">
-                                      <p:cBhvr>
-                                        <p:cTn id="28" dur="1000" fill="hold"/>
-                                        <p:tgtEl>
-                                          <p:spTgt spid="7"/>
-                                        </p:tgtEl>
-                                        <p:attrNameLst>
-                                          <p:attrName>ppt_x</p:attrName>
-                                        </p:attrNameLst>
-                                      </p:cBhvr>
-                                      <p:tavLst>
-                                        <p:tav tm="0">
-                                          <p:val>
-                                            <p:strVal val="#ppt_x"/>
-                                          </p:val>
-                                        </p:tav>
-                                        <p:tav tm="100000">
-                                          <p:val>
-                                            <p:strVal val="#ppt_x"/>
-                                          </p:val>
-                                        </p:tav>
-                                      </p:tavLst>
-                                    </p:anim>
-                                    <p:anim calcmode="lin" valueType="num">
-                                      <p:cBhvr>
-                                        <p:cTn id="29" dur="1000" fill="hold"/>
-                                        <p:tgtEl>
-                                          <p:spTgt spid="7"/>
-                                        </p:tgtEl>
-                                        <p:attrNameLst>
-                                          <p:attrName>ppt_y</p:attrName>
-                                        </p:attrNameLst>
-                                      </p:cBhvr>
-                                      <p:tavLst>
-                                        <p:tav tm="0">
-                                          <p:val>
-                                            <p:strVal val="#ppt_y+.1"/>
-                                          </p:val>
-                                        </p:tav>
-                                        <p:tav tm="100000">
-                                          <p:val>
-                                            <p:strVal val="#ppt_y"/>
-                                          </p:val>
-                                        </p:tav>
-                                      </p:tavLst>
-                                    </p:anim>
-                                  </p:childTnLst>
-                                </p:cTn>
-                              </p:par>
-                            </p:childTnLst>
-                          </p:cTn>
-                        </p:par>
-                      </p:childTnLst>
-                    </p:cTn>
-                  </p:par>
-                </p:childTnLst>
-              </p:cTn>
-              <p:prevCondLst>
-                <p:cond evt="onPrev" delay="0">
-                  <p:tgtEl>
-                    <p:sldTgt/>
-                  </p:tgtEl>
-                </p:cond>
-              </p:prevCondLst>
-              <p:nextCondLst>
-                <p:cond evt="onNext" delay="0">
-                  <p:tgtEl>
-                    <p:sldTgt/>
-                  </p:tgtEl>
-                </p:cond>
-              </p:nextCondLst>
-            </p:seq>
-          </p:childTnLst>
-        </p:cTn>
+        <p:cTn id="1" dur="indefinite" restart="never" nodeType="tmRoot"/>
       </p:par>
     </p:tnLst>
-    <p:bldLst>
-      <p:bldP spid="3" grpId="0" uiExpand="1" build="p"/>
-    </p:bldLst>
   </p:timing>
 </p:sld>
 </file>

</xml_diff>